<commit_message>
Fill in the slides
JIRA:

DESCRIPTION:
</commit_message>
<xml_diff>
--- a/2014/supersize-nodejs/supersize-nodejs-dr.pptx
+++ b/2014/supersize-nodejs/supersize-nodejs-dr.pptx
@@ -6,26 +6,24 @@
     <p:sldMasterId id="2147483667" r:id="rId5"/>
   </p:sldMasterIdLst>
   <p:notesMasterIdLst>
-    <p:notesMasterId r:id="rId20"/>
+    <p:notesMasterId r:id="rId18"/>
   </p:notesMasterIdLst>
   <p:handoutMasterIdLst>
-    <p:handoutMasterId r:id="rId21"/>
+    <p:handoutMasterId r:id="rId19"/>
   </p:handoutMasterIdLst>
   <p:sldIdLst>
     <p:sldId id="293" r:id="rId6"/>
-    <p:sldId id="298" r:id="rId7"/>
-    <p:sldId id="299" r:id="rId8"/>
-    <p:sldId id="300" r:id="rId9"/>
-    <p:sldId id="301" r:id="rId10"/>
-    <p:sldId id="302" r:id="rId11"/>
-    <p:sldId id="303" r:id="rId12"/>
-    <p:sldId id="308" r:id="rId13"/>
-    <p:sldId id="304" r:id="rId14"/>
-    <p:sldId id="305" r:id="rId15"/>
-    <p:sldId id="309" r:id="rId16"/>
-    <p:sldId id="306" r:id="rId17"/>
-    <p:sldId id="307" r:id="rId18"/>
-    <p:sldId id="297" r:id="rId19"/>
+    <p:sldId id="299" r:id="rId7"/>
+    <p:sldId id="300" r:id="rId8"/>
+    <p:sldId id="301" r:id="rId9"/>
+    <p:sldId id="302" r:id="rId10"/>
+    <p:sldId id="303" r:id="rId11"/>
+    <p:sldId id="308" r:id="rId12"/>
+    <p:sldId id="305" r:id="rId13"/>
+    <p:sldId id="309" r:id="rId14"/>
+    <p:sldId id="306" r:id="rId15"/>
+    <p:sldId id="307" r:id="rId16"/>
+    <p:sldId id="297" r:id="rId17"/>
   </p:sldIdLst>
   <p:sldSz cx="16257588" cy="9144000"/>
   <p:notesSz cx="6858000" cy="9144000"/>
@@ -225,7 +223,7 @@
           <a:p>
             <a:fld id="{387C2776-B9DD-1946-9831-785CA23AC1F1}" type="datetime1">
               <a:rPr lang="en-US" smtClean="0"/>
-              <a:t>5/7/2014</a:t>
+              <a:t>5/9/2014</a:t>
             </a:fld>
             <a:endParaRPr lang="en-US" dirty="0"/>
           </a:p>
@@ -391,7 +389,7 @@
           <a:p>
             <a:fld id="{13A1C7DD-7A43-8947-A922-8561F0BA9BCC}" type="datetime1">
               <a:rPr lang="en-US" smtClean="0"/>
-              <a:t>5/7/2014</a:t>
+              <a:t>5/9/2014</a:t>
             </a:fld>
             <a:endParaRPr lang="en-US" dirty="0"/>
           </a:p>
@@ -704,30 +702,6 @@
           <a:bodyPr/>
           <a:lstStyle/>
           <a:p>
-            <a:r>
-              <a:rPr lang="en-US" dirty="0" smtClean="0"/>
-              <a:t>Git</a:t>
-            </a:r>
-          </a:p>
-          <a:p>
-            <a:r>
-              <a:rPr lang="en-US" dirty="0" smtClean="0"/>
-              <a:t>Node.js Modules</a:t>
-            </a:r>
-          </a:p>
-          <a:p>
-            <a:r>
-              <a:rPr lang="en-US" dirty="0" smtClean="0"/>
-              <a:t>Decoupling from </a:t>
-            </a:r>
-            <a:r>
-              <a:rPr lang="en-US" dirty="0" err="1" smtClean="0"/>
-              <a:t>npm</a:t>
-            </a:r>
-            <a:r>
-              <a:rPr lang="en-US" dirty="0" smtClean="0"/>
-              <a:t> registry</a:t>
-            </a:r>
             <a:endParaRPr lang="en-US" dirty="0"/>
           </a:p>
         </p:txBody>
@@ -749,7 +723,7 @@
           <a:p>
             <a:fld id="{73E9330B-B1DA-214B-A229-0CB8492B91A5}" type="slidenum">
               <a:rPr lang="en-US" smtClean="0"/>
-              <a:t>6</a:t>
+              <a:t>1</a:t>
             </a:fld>
             <a:endParaRPr lang="en-US" dirty="0"/>
           </a:p>
@@ -758,7 +732,201 @@
     </p:spTree>
     <p:extLst>
       <p:ext uri="{BB962C8B-B14F-4D97-AF65-F5344CB8AC3E}">
-        <p14:creationId xmlns:p14="http://schemas.microsoft.com/office/powerpoint/2010/main" val="2968869188"/>
+        <p14:creationId xmlns:p14="http://schemas.microsoft.com/office/powerpoint/2010/main" val="3818981901"/>
+      </p:ext>
+    </p:extLst>
+  </p:cSld>
+  <p:clrMapOvr>
+    <a:masterClrMapping/>
+  </p:clrMapOvr>
+</p:notes>
+</file>
+
+<file path=ppt/notesSlides/notesSlide10.xml><?xml version="1.0" encoding="utf-8"?>
+<p:notes xmlns:a="http://schemas.openxmlformats.org/drawingml/2006/main" xmlns:r="http://schemas.openxmlformats.org/officeDocument/2006/relationships" xmlns:p="http://schemas.openxmlformats.org/presentationml/2006/main">
+  <p:cSld>
+    <p:spTree>
+      <p:nvGrpSpPr>
+        <p:cNvPr id="1" name=""/>
+        <p:cNvGrpSpPr/>
+        <p:nvPr/>
+      </p:nvGrpSpPr>
+      <p:grpSpPr>
+        <a:xfrm>
+          <a:off x="0" y="0"/>
+          <a:ext cx="0" cy="0"/>
+          <a:chOff x="0" y="0"/>
+          <a:chExt cx="0" cy="0"/>
+        </a:xfrm>
+      </p:grpSpPr>
+      <p:sp>
+        <p:nvSpPr>
+          <p:cNvPr id="2" name="Slide Image Placeholder 1"/>
+          <p:cNvSpPr>
+            <a:spLocks noGrp="1" noRot="1" noChangeAspect="1"/>
+          </p:cNvSpPr>
+          <p:nvPr>
+            <p:ph type="sldImg"/>
+          </p:nvPr>
+        </p:nvSpPr>
+        <p:spPr/>
+      </p:sp>
+      <p:sp>
+        <p:nvSpPr>
+          <p:cNvPr id="3" name="Notes Placeholder 2"/>
+          <p:cNvSpPr>
+            <a:spLocks noGrp="1"/>
+          </p:cNvSpPr>
+          <p:nvPr>
+            <p:ph type="body" idx="1"/>
+          </p:nvPr>
+        </p:nvSpPr>
+        <p:spPr/>
+        <p:txBody>
+          <a:bodyPr/>
+          <a:lstStyle/>
+          <a:p>
+            <a:r>
+              <a:rPr lang="en-US" dirty="0" smtClean="0"/>
+              <a:t>Monitor page should the individual</a:t>
+            </a:r>
+            <a:r>
+              <a:rPr lang="en-US" baseline="0" dirty="0" smtClean="0"/>
+              <a:t> status of each services and his dependencies.</a:t>
+            </a:r>
+          </a:p>
+          <a:p>
+            <a:endParaRPr lang="en-US" baseline="0" dirty="0" smtClean="0"/>
+          </a:p>
+          <a:p>
+            <a:endParaRPr lang="en-US" baseline="0" dirty="0" smtClean="0"/>
+          </a:p>
+          <a:p>
+            <a:r>
+              <a:rPr lang="en-US" baseline="0" dirty="0" smtClean="0"/>
+              <a:t>TODO: Explain logs and tracing on a different page.</a:t>
+            </a:r>
+          </a:p>
+          <a:p>
+            <a:endParaRPr lang="en-US" dirty="0"/>
+          </a:p>
+        </p:txBody>
+      </p:sp>
+      <p:sp>
+        <p:nvSpPr>
+          <p:cNvPr id="4" name="Slide Number Placeholder 3"/>
+          <p:cNvSpPr>
+            <a:spLocks noGrp="1"/>
+          </p:cNvSpPr>
+          <p:nvPr>
+            <p:ph type="sldNum" sz="quarter" idx="10"/>
+          </p:nvPr>
+        </p:nvSpPr>
+        <p:spPr/>
+        <p:txBody>
+          <a:bodyPr/>
+          <a:lstStyle/>
+          <a:p>
+            <a:fld id="{73E9330B-B1DA-214B-A229-0CB8492B91A5}" type="slidenum">
+              <a:rPr lang="en-US" smtClean="0"/>
+              <a:t>10</a:t>
+            </a:fld>
+            <a:endParaRPr lang="en-US" dirty="0"/>
+          </a:p>
+        </p:txBody>
+      </p:sp>
+    </p:spTree>
+    <p:extLst>
+      <p:ext uri="{BB962C8B-B14F-4D97-AF65-F5344CB8AC3E}">
+        <p14:creationId xmlns:p14="http://schemas.microsoft.com/office/powerpoint/2010/main" val="4076396646"/>
+      </p:ext>
+    </p:extLst>
+  </p:cSld>
+  <p:clrMapOvr>
+    <a:masterClrMapping/>
+  </p:clrMapOvr>
+</p:notes>
+</file>
+
+<file path=ppt/notesSlides/notesSlide11.xml><?xml version="1.0" encoding="utf-8"?>
+<p:notes xmlns:a="http://schemas.openxmlformats.org/drawingml/2006/main" xmlns:r="http://schemas.openxmlformats.org/officeDocument/2006/relationships" xmlns:p="http://schemas.openxmlformats.org/presentationml/2006/main">
+  <p:cSld>
+    <p:spTree>
+      <p:nvGrpSpPr>
+        <p:cNvPr id="1" name=""/>
+        <p:cNvGrpSpPr/>
+        <p:nvPr/>
+      </p:nvGrpSpPr>
+      <p:grpSpPr>
+        <a:xfrm>
+          <a:off x="0" y="0"/>
+          <a:ext cx="0" cy="0"/>
+          <a:chOff x="0" y="0"/>
+          <a:chExt cx="0" cy="0"/>
+        </a:xfrm>
+      </p:grpSpPr>
+      <p:sp>
+        <p:nvSpPr>
+          <p:cNvPr id="2" name="Slide Image Placeholder 1"/>
+          <p:cNvSpPr>
+            <a:spLocks noGrp="1" noRot="1" noChangeAspect="1"/>
+          </p:cNvSpPr>
+          <p:nvPr>
+            <p:ph type="sldImg"/>
+          </p:nvPr>
+        </p:nvSpPr>
+        <p:spPr/>
+      </p:sp>
+      <p:sp>
+        <p:nvSpPr>
+          <p:cNvPr id="3" name="Notes Placeholder 2"/>
+          <p:cNvSpPr>
+            <a:spLocks noGrp="1"/>
+          </p:cNvSpPr>
+          <p:nvPr>
+            <p:ph type="body" idx="1"/>
+          </p:nvPr>
+        </p:nvSpPr>
+        <p:spPr/>
+        <p:txBody>
+          <a:bodyPr/>
+          <a:lstStyle/>
+          <a:p>
+            <a:r>
+              <a:rPr lang="en-US" dirty="0" smtClean="0"/>
+              <a:t>tack</a:t>
+            </a:r>
+            <a:endParaRPr lang="en-US" dirty="0"/>
+          </a:p>
+        </p:txBody>
+      </p:sp>
+      <p:sp>
+        <p:nvSpPr>
+          <p:cNvPr id="4" name="Slide Number Placeholder 3"/>
+          <p:cNvSpPr>
+            <a:spLocks noGrp="1"/>
+          </p:cNvSpPr>
+          <p:nvPr>
+            <p:ph type="sldNum" sz="quarter" idx="10"/>
+          </p:nvPr>
+        </p:nvSpPr>
+        <p:spPr/>
+        <p:txBody>
+          <a:bodyPr/>
+          <a:lstStyle/>
+          <a:p>
+            <a:fld id="{73E9330B-B1DA-214B-A229-0CB8492B91A5}" type="slidenum">
+              <a:rPr lang="en-US" smtClean="0"/>
+              <a:t>11</a:t>
+            </a:fld>
+            <a:endParaRPr lang="en-US" dirty="0"/>
+          </a:p>
+        </p:txBody>
+      </p:sp>
+    </p:spTree>
+    <p:extLst>
+      <p:ext uri="{BB962C8B-B14F-4D97-AF65-F5344CB8AC3E}">
+        <p14:creationId xmlns:p14="http://schemas.microsoft.com/office/powerpoint/2010/main" val="4232499714"/>
       </p:ext>
     </p:extLst>
   </p:cSld>
@@ -812,105 +980,30 @@
           <a:bodyPr/>
           <a:lstStyle/>
           <a:p>
+            <a:pPr marL="0" marR="0" indent="0" algn="l" defTabSz="812810" rtl="0" eaLnBrk="1" fontAlgn="auto" latinLnBrk="0" hangingPunct="1">
+              <a:lnSpc>
+                <a:spcPct val="100000"/>
+              </a:lnSpc>
+              <a:spcBef>
+                <a:spcPts val="0"/>
+              </a:spcBef>
+              <a:spcAft>
+                <a:spcPts val="0"/>
+              </a:spcAft>
+              <a:buClrTx/>
+              <a:buSzTx/>
+              <a:buFontTx/>
+              <a:buNone/>
+              <a:tabLst/>
+              <a:defRPr/>
+            </a:pPr>
             <a:r>
               <a:rPr lang="en-US" dirty="0" smtClean="0"/>
-              <a:t>Steps from</a:t>
-            </a:r>
-            <a:r>
-              <a:rPr lang="en-US" baseline="0" dirty="0" smtClean="0"/>
-              <a:t> a vanilla Ubuntu image</a:t>
-            </a:r>
-            <a:endParaRPr lang="en-US" dirty="0" smtClean="0"/>
-          </a:p>
-          <a:p>
-            <a:endParaRPr lang="en-US" dirty="0" smtClean="0"/>
-          </a:p>
-          <a:p>
-            <a:r>
-              <a:rPr lang="en-US" baseline="0" dirty="0" smtClean="0"/>
-              <a:t>Download and Install Chef</a:t>
-            </a:r>
-          </a:p>
-          <a:p>
-            <a:r>
-              <a:rPr lang="en-US" dirty="0" smtClean="0"/>
-              <a:t>Run Chef</a:t>
-            </a:r>
-          </a:p>
-          <a:p>
-            <a:r>
-              <a:rPr lang="en-US" baseline="0" dirty="0" smtClean="0"/>
-              <a:t> * Install OS packages</a:t>
-            </a:r>
-          </a:p>
-          <a:p>
-            <a:r>
-              <a:rPr lang="en-US" baseline="0" dirty="0" smtClean="0"/>
-              <a:t> * Install node.js</a:t>
-            </a:r>
-          </a:p>
-          <a:p>
-            <a:r>
-              <a:rPr lang="en-US" baseline="0" dirty="0" smtClean="0"/>
-              <a:t> * Get code from </a:t>
-            </a:r>
-            <a:r>
-              <a:rPr lang="en-US" baseline="0" dirty="0" err="1" smtClean="0"/>
-              <a:t>gitolite</a:t>
-            </a:r>
-            <a:r>
-              <a:rPr lang="en-US" baseline="0" dirty="0" smtClean="0"/>
-              <a:t> server</a:t>
-            </a:r>
-          </a:p>
-          <a:p>
-            <a:r>
-              <a:rPr lang="en-US" baseline="0" dirty="0" smtClean="0"/>
-              <a:t> * </a:t>
-            </a:r>
-            <a:r>
-              <a:rPr lang="en-US" baseline="0" dirty="0" err="1" smtClean="0"/>
-              <a:t>npm</a:t>
-            </a:r>
-            <a:r>
-              <a:rPr lang="en-US" baseline="0" dirty="0" smtClean="0"/>
-              <a:t> rebuild</a:t>
-            </a:r>
-          </a:p>
-          <a:p>
-            <a:r>
-              <a:rPr lang="en-US" baseline="0" dirty="0" smtClean="0"/>
-              <a:t> * Write upstart configuration</a:t>
-            </a:r>
-          </a:p>
-          <a:p>
-            <a:r>
-              <a:rPr lang="en-US" baseline="0" dirty="0" smtClean="0"/>
-              <a:t> * Generate </a:t>
-            </a:r>
-            <a:r>
-              <a:rPr lang="en-US" baseline="0" dirty="0" err="1" smtClean="0"/>
-              <a:t>config</a:t>
-            </a:r>
-            <a:r>
-              <a:rPr lang="en-US" baseline="0" dirty="0" smtClean="0"/>
-              <a:t> file</a:t>
-            </a:r>
-          </a:p>
-          <a:p>
-            <a:r>
-              <a:rPr lang="en-US" baseline="0" dirty="0" smtClean="0"/>
-              <a:t> * Start the service</a:t>
-            </a:r>
-          </a:p>
-          <a:p>
-            <a:endParaRPr lang="en-US" baseline="0" dirty="0" smtClean="0"/>
-          </a:p>
-          <a:p>
-            <a:endParaRPr lang="en-US" baseline="0" dirty="0" smtClean="0"/>
-          </a:p>
-          <a:p>
-            <a:endParaRPr lang="en-US" baseline="0" dirty="0" smtClean="0"/>
+              <a:t>TODO: Define or delete</a:t>
+            </a:r>
+          </a:p>
+          <a:p>
+            <a:endParaRPr lang="en-US" dirty="0"/>
           </a:p>
         </p:txBody>
       </p:sp>
@@ -931,7 +1024,822 @@
           <a:p>
             <a:fld id="{73E9330B-B1DA-214B-A229-0CB8492B91A5}" type="slidenum">
               <a:rPr lang="en-US" smtClean="0"/>
-              <a:t>8</a:t>
+              <a:t>2</a:t>
+            </a:fld>
+            <a:endParaRPr lang="en-US" dirty="0"/>
+          </a:p>
+        </p:txBody>
+      </p:sp>
+    </p:spTree>
+    <p:extLst>
+      <p:ext uri="{BB962C8B-B14F-4D97-AF65-F5344CB8AC3E}">
+        <p14:creationId xmlns:p14="http://schemas.microsoft.com/office/powerpoint/2010/main" val="3779366650"/>
+      </p:ext>
+    </p:extLst>
+  </p:cSld>
+  <p:clrMapOvr>
+    <a:masterClrMapping/>
+  </p:clrMapOvr>
+</p:notes>
+</file>
+
+<file path=ppt/notesSlides/notesSlide3.xml><?xml version="1.0" encoding="utf-8"?>
+<p:notes xmlns:a="http://schemas.openxmlformats.org/drawingml/2006/main" xmlns:r="http://schemas.openxmlformats.org/officeDocument/2006/relationships" xmlns:p="http://schemas.openxmlformats.org/presentationml/2006/main">
+  <p:cSld>
+    <p:spTree>
+      <p:nvGrpSpPr>
+        <p:cNvPr id="1" name=""/>
+        <p:cNvGrpSpPr/>
+        <p:nvPr/>
+      </p:nvGrpSpPr>
+      <p:grpSpPr>
+        <a:xfrm>
+          <a:off x="0" y="0"/>
+          <a:ext cx="0" cy="0"/>
+          <a:chOff x="0" y="0"/>
+          <a:chExt cx="0" cy="0"/>
+        </a:xfrm>
+      </p:grpSpPr>
+      <p:sp>
+        <p:nvSpPr>
+          <p:cNvPr id="2" name="Slide Image Placeholder 1"/>
+          <p:cNvSpPr>
+            <a:spLocks noGrp="1" noRot="1" noChangeAspect="1"/>
+          </p:cNvSpPr>
+          <p:nvPr>
+            <p:ph type="sldImg"/>
+          </p:nvPr>
+        </p:nvSpPr>
+        <p:spPr/>
+      </p:sp>
+      <p:sp>
+        <p:nvSpPr>
+          <p:cNvPr id="3" name="Notes Placeholder 2"/>
+          <p:cNvSpPr>
+            <a:spLocks noGrp="1"/>
+          </p:cNvSpPr>
+          <p:nvPr>
+            <p:ph type="body" idx="1"/>
+          </p:nvPr>
+        </p:nvSpPr>
+        <p:spPr/>
+        <p:txBody>
+          <a:bodyPr/>
+          <a:lstStyle/>
+          <a:p>
+            <a:r>
+              <a:rPr lang="en-US" dirty="0" smtClean="0"/>
+              <a:t>Each branch </a:t>
+            </a:r>
+            <a:endParaRPr lang="en-US" dirty="0"/>
+          </a:p>
+        </p:txBody>
+      </p:sp>
+      <p:sp>
+        <p:nvSpPr>
+          <p:cNvPr id="4" name="Slide Number Placeholder 3"/>
+          <p:cNvSpPr>
+            <a:spLocks noGrp="1"/>
+          </p:cNvSpPr>
+          <p:nvPr>
+            <p:ph type="sldNum" sz="quarter" idx="10"/>
+          </p:nvPr>
+        </p:nvSpPr>
+        <p:spPr/>
+        <p:txBody>
+          <a:bodyPr/>
+          <a:lstStyle/>
+          <a:p>
+            <a:fld id="{73E9330B-B1DA-214B-A229-0CB8492B91A5}" type="slidenum">
+              <a:rPr lang="en-US" smtClean="0"/>
+              <a:t>3</a:t>
+            </a:fld>
+            <a:endParaRPr lang="en-US" dirty="0"/>
+          </a:p>
+        </p:txBody>
+      </p:sp>
+    </p:spTree>
+    <p:extLst>
+      <p:ext uri="{BB962C8B-B14F-4D97-AF65-F5344CB8AC3E}">
+        <p14:creationId xmlns:p14="http://schemas.microsoft.com/office/powerpoint/2010/main" val="1142619897"/>
+      </p:ext>
+    </p:extLst>
+  </p:cSld>
+  <p:clrMapOvr>
+    <a:masterClrMapping/>
+  </p:clrMapOvr>
+</p:notes>
+</file>
+
+<file path=ppt/notesSlides/notesSlide4.xml><?xml version="1.0" encoding="utf-8"?>
+<p:notes xmlns:a="http://schemas.openxmlformats.org/drawingml/2006/main" xmlns:r="http://schemas.openxmlformats.org/officeDocument/2006/relationships" xmlns:p="http://schemas.openxmlformats.org/presentationml/2006/main">
+  <p:cSld>
+    <p:spTree>
+      <p:nvGrpSpPr>
+        <p:cNvPr id="1" name=""/>
+        <p:cNvGrpSpPr/>
+        <p:nvPr/>
+      </p:nvGrpSpPr>
+      <p:grpSpPr>
+        <a:xfrm>
+          <a:off x="0" y="0"/>
+          <a:ext cx="0" cy="0"/>
+          <a:chOff x="0" y="0"/>
+          <a:chExt cx="0" cy="0"/>
+        </a:xfrm>
+      </p:grpSpPr>
+      <p:sp>
+        <p:nvSpPr>
+          <p:cNvPr id="2" name="Slide Image Placeholder 1"/>
+          <p:cNvSpPr>
+            <a:spLocks noGrp="1" noRot="1" noChangeAspect="1"/>
+          </p:cNvSpPr>
+          <p:nvPr>
+            <p:ph type="sldImg"/>
+          </p:nvPr>
+        </p:nvSpPr>
+        <p:spPr/>
+      </p:sp>
+      <p:sp>
+        <p:nvSpPr>
+          <p:cNvPr id="3" name="Notes Placeholder 2"/>
+          <p:cNvSpPr>
+            <a:spLocks noGrp="1"/>
+          </p:cNvSpPr>
+          <p:nvPr>
+            <p:ph type="body" idx="1"/>
+          </p:nvPr>
+        </p:nvSpPr>
+        <p:spPr/>
+        <p:txBody>
+          <a:bodyPr/>
+          <a:lstStyle/>
+          <a:p>
+            <a:pPr marL="0" marR="0" indent="0" algn="l" defTabSz="812810" rtl="0" eaLnBrk="1" fontAlgn="auto" latinLnBrk="0" hangingPunct="1">
+              <a:lnSpc>
+                <a:spcPct val="100000"/>
+              </a:lnSpc>
+              <a:spcBef>
+                <a:spcPts val="0"/>
+              </a:spcBef>
+              <a:spcAft>
+                <a:spcPts val="0"/>
+              </a:spcAft>
+              <a:buClrTx/>
+              <a:buSzTx/>
+              <a:buFontTx/>
+              <a:buNone/>
+              <a:tabLst/>
+              <a:defRPr/>
+            </a:pPr>
+            <a:r>
+              <a:rPr lang="en-US" dirty="0" smtClean="0"/>
+              <a:t>Create and delete stack</a:t>
+            </a:r>
+          </a:p>
+          <a:p>
+            <a:pPr marL="342900" indent="-342900">
+              <a:buFont typeface="Arial" pitchFamily="34" charset="0"/>
+              <a:buChar char="•"/>
+            </a:pPr>
+            <a:r>
+              <a:rPr lang="en-US" dirty="0" smtClean="0"/>
+              <a:t>Easy</a:t>
+            </a:r>
+            <a:r>
+              <a:rPr lang="en-US" baseline="0" dirty="0" smtClean="0"/>
+              <a:t> stack management</a:t>
+            </a:r>
+          </a:p>
+          <a:p>
+            <a:pPr marL="342900" indent="-342900">
+              <a:buFont typeface="Arial" pitchFamily="34" charset="0"/>
+              <a:buChar char="•"/>
+            </a:pPr>
+            <a:endParaRPr lang="en-US" baseline="0" dirty="0" smtClean="0"/>
+          </a:p>
+          <a:p>
+            <a:pPr marL="342900" indent="-342900">
+              <a:buFont typeface="Arial" pitchFamily="34" charset="0"/>
+              <a:buChar char="•"/>
+            </a:pPr>
+            <a:endParaRPr lang="en-US" baseline="0" dirty="0" smtClean="0"/>
+          </a:p>
+          <a:p>
+            <a:pPr marL="342900" marR="0" indent="-342900" algn="l" defTabSz="812810" rtl="0" eaLnBrk="1" fontAlgn="auto" latinLnBrk="0" hangingPunct="1">
+              <a:lnSpc>
+                <a:spcPct val="100000"/>
+              </a:lnSpc>
+              <a:spcBef>
+                <a:spcPts val="0"/>
+              </a:spcBef>
+              <a:spcAft>
+                <a:spcPts val="0"/>
+              </a:spcAft>
+              <a:buClrTx/>
+              <a:buSzTx/>
+              <a:buFont typeface="Arial" pitchFamily="34" charset="0"/>
+              <a:buChar char="•"/>
+              <a:tabLst/>
+              <a:defRPr/>
+            </a:pPr>
+            <a:r>
+              <a:rPr lang="en-US" dirty="0" smtClean="0"/>
+              <a:t>Update existing stack</a:t>
+            </a:r>
+          </a:p>
+          <a:p>
+            <a:pPr marL="1155710" lvl="1" indent="-342900">
+              <a:buFont typeface="Arial" pitchFamily="34" charset="0"/>
+              <a:buChar char="•"/>
+            </a:pPr>
+            <a:r>
+              <a:rPr lang="en-US" baseline="0" dirty="0" smtClean="0"/>
+              <a:t>Amazing capability to analyze the difference and only update needed resource</a:t>
+            </a:r>
+          </a:p>
+          <a:p>
+            <a:pPr marL="1155710" lvl="1" indent="-342900">
+              <a:buFont typeface="Arial" pitchFamily="34" charset="0"/>
+              <a:buChar char="•"/>
+            </a:pPr>
+            <a:r>
+              <a:rPr lang="en-US" baseline="0" dirty="0" smtClean="0"/>
+              <a:t>Talk about rolling update for </a:t>
+            </a:r>
+            <a:r>
+              <a:rPr lang="en-US" baseline="0" dirty="0" err="1" smtClean="0"/>
+              <a:t>AutoScaling</a:t>
+            </a:r>
+            <a:r>
+              <a:rPr lang="en-US" baseline="0" smtClean="0"/>
+              <a:t> group</a:t>
+            </a:r>
+            <a:endParaRPr lang="en-US" baseline="0" dirty="0" smtClean="0"/>
+          </a:p>
+          <a:p>
+            <a:pPr marL="342900" indent="-342900">
+              <a:buFont typeface="Arial" pitchFamily="34" charset="0"/>
+              <a:buChar char="•"/>
+            </a:pPr>
+            <a:endParaRPr lang="en-US" dirty="0" smtClean="0"/>
+          </a:p>
+        </p:txBody>
+      </p:sp>
+      <p:sp>
+        <p:nvSpPr>
+          <p:cNvPr id="4" name="Slide Number Placeholder 3"/>
+          <p:cNvSpPr>
+            <a:spLocks noGrp="1"/>
+          </p:cNvSpPr>
+          <p:nvPr>
+            <p:ph type="sldNum" sz="quarter" idx="10"/>
+          </p:nvPr>
+        </p:nvSpPr>
+        <p:spPr/>
+        <p:txBody>
+          <a:bodyPr/>
+          <a:lstStyle/>
+          <a:p>
+            <a:fld id="{73E9330B-B1DA-214B-A229-0CB8492B91A5}" type="slidenum">
+              <a:rPr lang="en-US" smtClean="0"/>
+              <a:t>4</a:t>
+            </a:fld>
+            <a:endParaRPr lang="en-US" dirty="0"/>
+          </a:p>
+        </p:txBody>
+      </p:sp>
+    </p:spTree>
+    <p:extLst>
+      <p:ext uri="{BB962C8B-B14F-4D97-AF65-F5344CB8AC3E}">
+        <p14:creationId xmlns:p14="http://schemas.microsoft.com/office/powerpoint/2010/main" val="2079027815"/>
+      </p:ext>
+    </p:extLst>
+  </p:cSld>
+  <p:clrMapOvr>
+    <a:masterClrMapping/>
+  </p:clrMapOvr>
+</p:notes>
+</file>
+
+<file path=ppt/notesSlides/notesSlide5.xml><?xml version="1.0" encoding="utf-8"?>
+<p:notes xmlns:a="http://schemas.openxmlformats.org/drawingml/2006/main" xmlns:r="http://schemas.openxmlformats.org/officeDocument/2006/relationships" xmlns:p="http://schemas.openxmlformats.org/presentationml/2006/main">
+  <p:cSld>
+    <p:spTree>
+      <p:nvGrpSpPr>
+        <p:cNvPr id="1" name=""/>
+        <p:cNvGrpSpPr/>
+        <p:nvPr/>
+      </p:nvGrpSpPr>
+      <p:grpSpPr>
+        <a:xfrm>
+          <a:off x="0" y="0"/>
+          <a:ext cx="0" cy="0"/>
+          <a:chOff x="0" y="0"/>
+          <a:chExt cx="0" cy="0"/>
+        </a:xfrm>
+      </p:grpSpPr>
+      <p:sp>
+        <p:nvSpPr>
+          <p:cNvPr id="2" name="Slide Image Placeholder 1"/>
+          <p:cNvSpPr>
+            <a:spLocks noGrp="1" noRot="1" noChangeAspect="1"/>
+          </p:cNvSpPr>
+          <p:nvPr>
+            <p:ph type="sldImg"/>
+          </p:nvPr>
+        </p:nvSpPr>
+        <p:spPr/>
+      </p:sp>
+      <p:sp>
+        <p:nvSpPr>
+          <p:cNvPr id="3" name="Notes Placeholder 2"/>
+          <p:cNvSpPr>
+            <a:spLocks noGrp="1"/>
+          </p:cNvSpPr>
+          <p:nvPr>
+            <p:ph type="body" idx="1"/>
+          </p:nvPr>
+        </p:nvSpPr>
+        <p:spPr/>
+        <p:txBody>
+          <a:bodyPr/>
+          <a:lstStyle/>
+          <a:p>
+            <a:pPr marL="342900" indent="-342900">
+              <a:buFont typeface="Arial" pitchFamily="34" charset="0"/>
+              <a:buChar char="•"/>
+            </a:pPr>
+            <a:r>
+              <a:rPr lang="en-US" dirty="0" err="1" smtClean="0"/>
+              <a:t>Gitolite</a:t>
+            </a:r>
+            <a:endParaRPr lang="en-US" dirty="0" smtClean="0"/>
+          </a:p>
+          <a:p>
+            <a:pPr marL="342900" indent="-342900">
+              <a:buFont typeface="Arial" pitchFamily="34" charset="0"/>
+              <a:buChar char="•"/>
+            </a:pPr>
+            <a:r>
+              <a:rPr lang="en-US" dirty="0" smtClean="0"/>
+              <a:t>Node.js </a:t>
+            </a:r>
+            <a:r>
+              <a:rPr lang="en-US" dirty="0" smtClean="0"/>
+              <a:t>Modules</a:t>
+            </a:r>
+          </a:p>
+          <a:p>
+            <a:pPr marL="342900" indent="-342900">
+              <a:buFont typeface="Arial" pitchFamily="34" charset="0"/>
+              <a:buChar char="•"/>
+            </a:pPr>
+            <a:r>
+              <a:rPr lang="en-US" dirty="0" smtClean="0"/>
+              <a:t>Decoupling </a:t>
+            </a:r>
+            <a:r>
+              <a:rPr lang="en-US" dirty="0" smtClean="0"/>
+              <a:t>from </a:t>
+            </a:r>
+            <a:r>
+              <a:rPr lang="en-US" dirty="0" err="1" smtClean="0"/>
+              <a:t>npm</a:t>
+            </a:r>
+            <a:r>
+              <a:rPr lang="en-US" dirty="0" smtClean="0"/>
+              <a:t> registry and</a:t>
+            </a:r>
+            <a:r>
+              <a:rPr lang="en-US" baseline="0" dirty="0" smtClean="0"/>
+              <a:t> </a:t>
+            </a:r>
+            <a:r>
+              <a:rPr lang="en-US" baseline="0" dirty="0" err="1" smtClean="0"/>
+              <a:t>git</a:t>
+            </a:r>
+            <a:endParaRPr lang="en-US" baseline="0" dirty="0" smtClean="0"/>
+          </a:p>
+          <a:p>
+            <a:pPr marL="342900" indent="-342900">
+              <a:buFont typeface="Arial" pitchFamily="34" charset="0"/>
+              <a:buChar char="•"/>
+            </a:pPr>
+            <a:endParaRPr lang="en-US" baseline="0" dirty="0" smtClean="0"/>
+          </a:p>
+          <a:p>
+            <a:pPr marL="0" indent="0">
+              <a:buFont typeface="Arial" pitchFamily="34" charset="0"/>
+              <a:buNone/>
+            </a:pPr>
+            <a:r>
+              <a:rPr lang="en-US" baseline="0" dirty="0" smtClean="0"/>
+              <a:t>TODO</a:t>
+            </a:r>
+          </a:p>
+          <a:p>
+            <a:pPr marL="342900" indent="-342900">
+              <a:buFont typeface="Arial" pitchFamily="34" charset="0"/>
+              <a:buChar char="•"/>
+            </a:pPr>
+            <a:r>
+              <a:rPr lang="en-US" baseline="0" dirty="0" smtClean="0"/>
+              <a:t>Update drawing to remove </a:t>
+            </a:r>
+            <a:r>
+              <a:rPr lang="en-US" baseline="0" dirty="0" err="1" smtClean="0"/>
+              <a:t>abc</a:t>
+            </a:r>
+            <a:r>
+              <a:rPr lang="en-US" baseline="0" dirty="0" smtClean="0"/>
+              <a:t> repo box</a:t>
+            </a:r>
+          </a:p>
+          <a:p>
+            <a:pPr marL="342900" indent="-342900">
+              <a:buFont typeface="Arial" pitchFamily="34" charset="0"/>
+              <a:buChar char="•"/>
+            </a:pPr>
+            <a:endParaRPr lang="en-US" dirty="0"/>
+          </a:p>
+        </p:txBody>
+      </p:sp>
+      <p:sp>
+        <p:nvSpPr>
+          <p:cNvPr id="4" name="Slide Number Placeholder 3"/>
+          <p:cNvSpPr>
+            <a:spLocks noGrp="1"/>
+          </p:cNvSpPr>
+          <p:nvPr>
+            <p:ph type="sldNum" sz="quarter" idx="10"/>
+          </p:nvPr>
+        </p:nvSpPr>
+        <p:spPr/>
+        <p:txBody>
+          <a:bodyPr/>
+          <a:lstStyle/>
+          <a:p>
+            <a:fld id="{73E9330B-B1DA-214B-A229-0CB8492B91A5}" type="slidenum">
+              <a:rPr lang="en-US" smtClean="0"/>
+              <a:t>5</a:t>
+            </a:fld>
+            <a:endParaRPr lang="en-US" dirty="0"/>
+          </a:p>
+        </p:txBody>
+      </p:sp>
+    </p:spTree>
+    <p:extLst>
+      <p:ext uri="{BB962C8B-B14F-4D97-AF65-F5344CB8AC3E}">
+        <p14:creationId xmlns:p14="http://schemas.microsoft.com/office/powerpoint/2010/main" val="2968869188"/>
+      </p:ext>
+    </p:extLst>
+  </p:cSld>
+  <p:clrMapOvr>
+    <a:masterClrMapping/>
+  </p:clrMapOvr>
+</p:notes>
+</file>
+
+<file path=ppt/notesSlides/notesSlide6.xml><?xml version="1.0" encoding="utf-8"?>
+<p:notes xmlns:a="http://schemas.openxmlformats.org/drawingml/2006/main" xmlns:r="http://schemas.openxmlformats.org/officeDocument/2006/relationships" xmlns:p="http://schemas.openxmlformats.org/presentationml/2006/main">
+  <p:cSld>
+    <p:spTree>
+      <p:nvGrpSpPr>
+        <p:cNvPr id="1" name=""/>
+        <p:cNvGrpSpPr/>
+        <p:nvPr/>
+      </p:nvGrpSpPr>
+      <p:grpSpPr>
+        <a:xfrm>
+          <a:off x="0" y="0"/>
+          <a:ext cx="0" cy="0"/>
+          <a:chOff x="0" y="0"/>
+          <a:chExt cx="0" cy="0"/>
+        </a:xfrm>
+      </p:grpSpPr>
+      <p:sp>
+        <p:nvSpPr>
+          <p:cNvPr id="2" name="Slide Image Placeholder 1"/>
+          <p:cNvSpPr>
+            <a:spLocks noGrp="1" noRot="1" noChangeAspect="1"/>
+          </p:cNvSpPr>
+          <p:nvPr>
+            <p:ph type="sldImg"/>
+          </p:nvPr>
+        </p:nvSpPr>
+        <p:spPr/>
+      </p:sp>
+      <p:sp>
+        <p:nvSpPr>
+          <p:cNvPr id="3" name="Notes Placeholder 2"/>
+          <p:cNvSpPr>
+            <a:spLocks noGrp="1"/>
+          </p:cNvSpPr>
+          <p:nvPr>
+            <p:ph type="body" idx="1"/>
+          </p:nvPr>
+        </p:nvSpPr>
+        <p:spPr/>
+        <p:txBody>
+          <a:bodyPr/>
+          <a:lstStyle/>
+          <a:p>
+            <a:r>
+              <a:rPr lang="en-US" baseline="0" dirty="0" smtClean="0"/>
+              <a:t>Definition of the provisioning</a:t>
+            </a:r>
+          </a:p>
+          <a:p>
+            <a:endParaRPr lang="en-US" baseline="0" dirty="0" smtClean="0"/>
+          </a:p>
+          <a:p>
+            <a:pPr marL="342900" indent="-342900">
+              <a:buFontTx/>
+              <a:buChar char="-"/>
+            </a:pPr>
+            <a:r>
+              <a:rPr lang="en-US" baseline="0" dirty="0" smtClean="0"/>
+              <a:t>Configure a vanilla Linux machine to be ready to operate</a:t>
+            </a:r>
+          </a:p>
+          <a:p>
+            <a:pPr marL="342900" indent="-342900">
+              <a:buFontTx/>
+              <a:buChar char="-"/>
+            </a:pPr>
+            <a:endParaRPr lang="en-US" dirty="0" smtClean="0"/>
+          </a:p>
+          <a:p>
+            <a:pPr marL="0" indent="0">
+              <a:buFontTx/>
+              <a:buNone/>
+            </a:pPr>
+            <a:r>
+              <a:rPr lang="en-US" dirty="0" smtClean="0"/>
+              <a:t>Vagrant</a:t>
+            </a:r>
+          </a:p>
+          <a:p>
+            <a:pPr marL="342900" marR="0" indent="-342900" algn="l" defTabSz="812810" rtl="0" eaLnBrk="1" fontAlgn="auto" latinLnBrk="0" hangingPunct="1">
+              <a:lnSpc>
+                <a:spcPct val="100000"/>
+              </a:lnSpc>
+              <a:spcBef>
+                <a:spcPts val="0"/>
+              </a:spcBef>
+              <a:spcAft>
+                <a:spcPts val="0"/>
+              </a:spcAft>
+              <a:buClrTx/>
+              <a:buSzTx/>
+              <a:buFontTx/>
+              <a:buChar char="-"/>
+              <a:tabLst/>
+              <a:defRPr/>
+            </a:pPr>
+            <a:r>
+              <a:rPr lang="en-US" dirty="0" smtClean="0"/>
+              <a:t>Great way to quickly test Chef cookbooks</a:t>
+            </a:r>
+          </a:p>
+          <a:p>
+            <a:pPr marL="342900" marR="0" indent="-342900" algn="l" defTabSz="812810" rtl="0" eaLnBrk="1" fontAlgn="auto" latinLnBrk="0" hangingPunct="1">
+              <a:lnSpc>
+                <a:spcPct val="100000"/>
+              </a:lnSpc>
+              <a:spcBef>
+                <a:spcPts val="0"/>
+              </a:spcBef>
+              <a:spcAft>
+                <a:spcPts val="0"/>
+              </a:spcAft>
+              <a:buClrTx/>
+              <a:buSzTx/>
+              <a:buFontTx/>
+              <a:buChar char="-"/>
+              <a:tabLst/>
+              <a:defRPr/>
+            </a:pPr>
+            <a:r>
+              <a:rPr lang="en-US" dirty="0" smtClean="0"/>
+              <a:t>We</a:t>
+            </a:r>
+            <a:r>
+              <a:rPr lang="en-US" baseline="0" dirty="0" smtClean="0"/>
+              <a:t> had greater plan for Vagrant usage at the beginning but we only use it to test cookbooks.</a:t>
+            </a:r>
+            <a:endParaRPr lang="en-US" dirty="0" smtClean="0"/>
+          </a:p>
+          <a:p>
+            <a:pPr marL="0" indent="0">
+              <a:buFontTx/>
+              <a:buNone/>
+            </a:pPr>
+            <a:endParaRPr lang="en-US" dirty="0" smtClean="0"/>
+          </a:p>
+        </p:txBody>
+      </p:sp>
+      <p:sp>
+        <p:nvSpPr>
+          <p:cNvPr id="4" name="Slide Number Placeholder 3"/>
+          <p:cNvSpPr>
+            <a:spLocks noGrp="1"/>
+          </p:cNvSpPr>
+          <p:nvPr>
+            <p:ph type="sldNum" sz="quarter" idx="10"/>
+          </p:nvPr>
+        </p:nvSpPr>
+        <p:spPr/>
+        <p:txBody>
+          <a:bodyPr/>
+          <a:lstStyle/>
+          <a:p>
+            <a:fld id="{73E9330B-B1DA-214B-A229-0CB8492B91A5}" type="slidenum">
+              <a:rPr lang="en-US" smtClean="0"/>
+              <a:t>6</a:t>
+            </a:fld>
+            <a:endParaRPr lang="en-US" dirty="0"/>
+          </a:p>
+        </p:txBody>
+      </p:sp>
+    </p:spTree>
+    <p:extLst>
+      <p:ext uri="{BB962C8B-B14F-4D97-AF65-F5344CB8AC3E}">
+        <p14:creationId xmlns:p14="http://schemas.microsoft.com/office/powerpoint/2010/main" val="1035240050"/>
+      </p:ext>
+    </p:extLst>
+  </p:cSld>
+  <p:clrMapOvr>
+    <a:masterClrMapping/>
+  </p:clrMapOvr>
+</p:notes>
+</file>
+
+<file path=ppt/notesSlides/notesSlide7.xml><?xml version="1.0" encoding="utf-8"?>
+<p:notes xmlns:a="http://schemas.openxmlformats.org/drawingml/2006/main" xmlns:r="http://schemas.openxmlformats.org/officeDocument/2006/relationships" xmlns:p="http://schemas.openxmlformats.org/presentationml/2006/main">
+  <p:cSld>
+    <p:spTree>
+      <p:nvGrpSpPr>
+        <p:cNvPr id="1" name=""/>
+        <p:cNvGrpSpPr/>
+        <p:nvPr/>
+      </p:nvGrpSpPr>
+      <p:grpSpPr>
+        <a:xfrm>
+          <a:off x="0" y="0"/>
+          <a:ext cx="0" cy="0"/>
+          <a:chOff x="0" y="0"/>
+          <a:chExt cx="0" cy="0"/>
+        </a:xfrm>
+      </p:grpSpPr>
+      <p:sp>
+        <p:nvSpPr>
+          <p:cNvPr id="2" name="Slide Image Placeholder 1"/>
+          <p:cNvSpPr>
+            <a:spLocks noGrp="1" noRot="1" noChangeAspect="1"/>
+          </p:cNvSpPr>
+          <p:nvPr>
+            <p:ph type="sldImg"/>
+          </p:nvPr>
+        </p:nvSpPr>
+        <p:spPr/>
+      </p:sp>
+      <p:sp>
+        <p:nvSpPr>
+          <p:cNvPr id="3" name="Notes Placeholder 2"/>
+          <p:cNvSpPr>
+            <a:spLocks noGrp="1"/>
+          </p:cNvSpPr>
+          <p:nvPr>
+            <p:ph type="body" idx="1"/>
+          </p:nvPr>
+        </p:nvSpPr>
+        <p:spPr/>
+        <p:txBody>
+          <a:bodyPr/>
+          <a:lstStyle/>
+          <a:p>
+            <a:r>
+              <a:rPr lang="en-US" dirty="0" smtClean="0"/>
+              <a:t>Steps from</a:t>
+            </a:r>
+            <a:r>
+              <a:rPr lang="en-US" baseline="0" dirty="0" smtClean="0"/>
+              <a:t> a vanilla Ubuntu image</a:t>
+            </a:r>
+            <a:endParaRPr lang="en-US" dirty="0" smtClean="0"/>
+          </a:p>
+          <a:p>
+            <a:endParaRPr lang="en-US" dirty="0" smtClean="0"/>
+          </a:p>
+          <a:p>
+            <a:r>
+              <a:rPr lang="en-US" baseline="0" dirty="0" smtClean="0"/>
+              <a:t>Download and Install Chef</a:t>
+            </a:r>
+          </a:p>
+          <a:p>
+            <a:r>
+              <a:rPr lang="en-US" dirty="0" smtClean="0"/>
+              <a:t>Run Chef</a:t>
+            </a:r>
+          </a:p>
+          <a:p>
+            <a:r>
+              <a:rPr lang="en-US" baseline="0" dirty="0" smtClean="0"/>
+              <a:t> * Install OS packages</a:t>
+            </a:r>
+          </a:p>
+          <a:p>
+            <a:r>
+              <a:rPr lang="en-US" baseline="0" dirty="0" smtClean="0"/>
+              <a:t> * Install node.js</a:t>
+            </a:r>
+          </a:p>
+          <a:p>
+            <a:r>
+              <a:rPr lang="en-US" baseline="0" dirty="0" smtClean="0"/>
+              <a:t> * Get code from </a:t>
+            </a:r>
+            <a:r>
+              <a:rPr lang="en-US" baseline="0" dirty="0" err="1" smtClean="0"/>
+              <a:t>gitolite</a:t>
+            </a:r>
+            <a:r>
+              <a:rPr lang="en-US" baseline="0" dirty="0" smtClean="0"/>
+              <a:t> server</a:t>
+            </a:r>
+          </a:p>
+          <a:p>
+            <a:r>
+              <a:rPr lang="en-US" baseline="0" dirty="0" smtClean="0"/>
+              <a:t> * </a:t>
+            </a:r>
+            <a:r>
+              <a:rPr lang="en-US" baseline="0" dirty="0" err="1" smtClean="0"/>
+              <a:t>npm</a:t>
+            </a:r>
+            <a:r>
+              <a:rPr lang="en-US" baseline="0" dirty="0" smtClean="0"/>
+              <a:t> rebuild</a:t>
+            </a:r>
+          </a:p>
+          <a:p>
+            <a:r>
+              <a:rPr lang="en-US" baseline="0" dirty="0" smtClean="0"/>
+              <a:t> * Write upstart configuration</a:t>
+            </a:r>
+          </a:p>
+          <a:p>
+            <a:r>
+              <a:rPr lang="en-US" baseline="0" dirty="0" smtClean="0"/>
+              <a:t> * Generate </a:t>
+            </a:r>
+            <a:r>
+              <a:rPr lang="en-US" baseline="0" dirty="0" err="1" smtClean="0"/>
+              <a:t>config</a:t>
+            </a:r>
+            <a:r>
+              <a:rPr lang="en-US" baseline="0" dirty="0" smtClean="0"/>
+              <a:t> file</a:t>
+            </a:r>
+          </a:p>
+          <a:p>
+            <a:r>
+              <a:rPr lang="en-US" baseline="0" dirty="0" smtClean="0"/>
+              <a:t> * Start the service</a:t>
+            </a:r>
+          </a:p>
+          <a:p>
+            <a:endParaRPr lang="en-US" baseline="0" dirty="0" smtClean="0"/>
+          </a:p>
+          <a:p>
+            <a:endParaRPr lang="en-US" baseline="0" dirty="0" smtClean="0"/>
+          </a:p>
+          <a:p>
+            <a:endParaRPr lang="en-US" baseline="0" dirty="0" smtClean="0"/>
+          </a:p>
+        </p:txBody>
+      </p:sp>
+      <p:sp>
+        <p:nvSpPr>
+          <p:cNvPr id="4" name="Slide Number Placeholder 3"/>
+          <p:cNvSpPr>
+            <a:spLocks noGrp="1"/>
+          </p:cNvSpPr>
+          <p:nvPr>
+            <p:ph type="sldNum" sz="quarter" idx="10"/>
+          </p:nvPr>
+        </p:nvSpPr>
+        <p:spPr/>
+        <p:txBody>
+          <a:bodyPr/>
+          <a:lstStyle/>
+          <a:p>
+            <a:fld id="{73E9330B-B1DA-214B-A229-0CB8492B91A5}" type="slidenum">
+              <a:rPr lang="en-US" smtClean="0"/>
+              <a:t>7</a:t>
             </a:fld>
             <a:endParaRPr lang="en-US" dirty="0"/>
           </a:p>
@@ -941,6 +1849,195 @@
     <p:extLst>
       <p:ext uri="{BB962C8B-B14F-4D97-AF65-F5344CB8AC3E}">
         <p14:creationId xmlns:p14="http://schemas.microsoft.com/office/powerpoint/2010/main" val="4180817395"/>
+      </p:ext>
+    </p:extLst>
+  </p:cSld>
+  <p:clrMapOvr>
+    <a:masterClrMapping/>
+  </p:clrMapOvr>
+</p:notes>
+</file>
+
+<file path=ppt/notesSlides/notesSlide8.xml><?xml version="1.0" encoding="utf-8"?>
+<p:notes xmlns:a="http://schemas.openxmlformats.org/drawingml/2006/main" xmlns:r="http://schemas.openxmlformats.org/officeDocument/2006/relationships" xmlns:p="http://schemas.openxmlformats.org/presentationml/2006/main">
+  <p:cSld>
+    <p:spTree>
+      <p:nvGrpSpPr>
+        <p:cNvPr id="1" name=""/>
+        <p:cNvGrpSpPr/>
+        <p:nvPr/>
+      </p:nvGrpSpPr>
+      <p:grpSpPr>
+        <a:xfrm>
+          <a:off x="0" y="0"/>
+          <a:ext cx="0" cy="0"/>
+          <a:chOff x="0" y="0"/>
+          <a:chExt cx="0" cy="0"/>
+        </a:xfrm>
+      </p:grpSpPr>
+      <p:sp>
+        <p:nvSpPr>
+          <p:cNvPr id="2" name="Slide Image Placeholder 1"/>
+          <p:cNvSpPr>
+            <a:spLocks noGrp="1" noRot="1" noChangeAspect="1"/>
+          </p:cNvSpPr>
+          <p:nvPr>
+            <p:ph type="sldImg"/>
+          </p:nvPr>
+        </p:nvSpPr>
+        <p:spPr/>
+      </p:sp>
+      <p:sp>
+        <p:nvSpPr>
+          <p:cNvPr id="3" name="Notes Placeholder 2"/>
+          <p:cNvSpPr>
+            <a:spLocks noGrp="1"/>
+          </p:cNvSpPr>
+          <p:nvPr>
+            <p:ph type="body" idx="1"/>
+          </p:nvPr>
+        </p:nvSpPr>
+        <p:spPr/>
+        <p:txBody>
+          <a:bodyPr/>
+          <a:lstStyle/>
+          <a:p>
+            <a:r>
+              <a:rPr lang="en-US" dirty="0" smtClean="0"/>
+              <a:t>TODO: Define or delete</a:t>
+            </a:r>
+            <a:endParaRPr lang="en-US" dirty="0"/>
+          </a:p>
+        </p:txBody>
+      </p:sp>
+      <p:sp>
+        <p:nvSpPr>
+          <p:cNvPr id="4" name="Slide Number Placeholder 3"/>
+          <p:cNvSpPr>
+            <a:spLocks noGrp="1"/>
+          </p:cNvSpPr>
+          <p:nvPr>
+            <p:ph type="sldNum" sz="quarter" idx="10"/>
+          </p:nvPr>
+        </p:nvSpPr>
+        <p:spPr/>
+        <p:txBody>
+          <a:bodyPr/>
+          <a:lstStyle/>
+          <a:p>
+            <a:fld id="{73E9330B-B1DA-214B-A229-0CB8492B91A5}" type="slidenum">
+              <a:rPr lang="en-US" smtClean="0"/>
+              <a:t>8</a:t>
+            </a:fld>
+            <a:endParaRPr lang="en-US" dirty="0"/>
+          </a:p>
+        </p:txBody>
+      </p:sp>
+    </p:spTree>
+    <p:extLst>
+      <p:ext uri="{BB962C8B-B14F-4D97-AF65-F5344CB8AC3E}">
+        <p14:creationId xmlns:p14="http://schemas.microsoft.com/office/powerpoint/2010/main" val="2121991405"/>
+      </p:ext>
+    </p:extLst>
+  </p:cSld>
+  <p:clrMapOvr>
+    <a:masterClrMapping/>
+  </p:clrMapOvr>
+</p:notes>
+</file>
+
+<file path=ppt/notesSlides/notesSlide9.xml><?xml version="1.0" encoding="utf-8"?>
+<p:notes xmlns:a="http://schemas.openxmlformats.org/drawingml/2006/main" xmlns:r="http://schemas.openxmlformats.org/officeDocument/2006/relationships" xmlns:p="http://schemas.openxmlformats.org/presentationml/2006/main">
+  <p:cSld>
+    <p:spTree>
+      <p:nvGrpSpPr>
+        <p:cNvPr id="1" name=""/>
+        <p:cNvGrpSpPr/>
+        <p:nvPr/>
+      </p:nvGrpSpPr>
+      <p:grpSpPr>
+        <a:xfrm>
+          <a:off x="0" y="0"/>
+          <a:ext cx="0" cy="0"/>
+          <a:chOff x="0" y="0"/>
+          <a:chExt cx="0" cy="0"/>
+        </a:xfrm>
+      </p:grpSpPr>
+      <p:sp>
+        <p:nvSpPr>
+          <p:cNvPr id="2" name="Slide Image Placeholder 1"/>
+          <p:cNvSpPr>
+            <a:spLocks noGrp="1" noRot="1" noChangeAspect="1"/>
+          </p:cNvSpPr>
+          <p:nvPr>
+            <p:ph type="sldImg"/>
+          </p:nvPr>
+        </p:nvSpPr>
+        <p:spPr/>
+      </p:sp>
+      <p:sp>
+        <p:nvSpPr>
+          <p:cNvPr id="3" name="Notes Placeholder 2"/>
+          <p:cNvSpPr>
+            <a:spLocks noGrp="1"/>
+          </p:cNvSpPr>
+          <p:nvPr>
+            <p:ph type="body" idx="1"/>
+          </p:nvPr>
+        </p:nvSpPr>
+        <p:spPr/>
+        <p:txBody>
+          <a:bodyPr/>
+          <a:lstStyle/>
+          <a:p>
+            <a:r>
+              <a:rPr lang="en-US" dirty="0" smtClean="0"/>
+              <a:t>Stack family</a:t>
+            </a:r>
+            <a:r>
+              <a:rPr lang="en-US" baseline="0" dirty="0" smtClean="0"/>
+              <a:t> is a represented by a URL, the data evolve over time.</a:t>
+            </a:r>
+          </a:p>
+          <a:p>
+            <a:endParaRPr lang="en-US" baseline="0" dirty="0" smtClean="0"/>
+          </a:p>
+          <a:p>
+            <a:r>
+              <a:rPr lang="en-US" baseline="0" dirty="0" smtClean="0"/>
+              <a:t>Each stack family has his own data, this allow to properly test data migration.</a:t>
+            </a:r>
+            <a:endParaRPr lang="en-US" dirty="0"/>
+          </a:p>
+        </p:txBody>
+      </p:sp>
+      <p:sp>
+        <p:nvSpPr>
+          <p:cNvPr id="4" name="Slide Number Placeholder 3"/>
+          <p:cNvSpPr>
+            <a:spLocks noGrp="1"/>
+          </p:cNvSpPr>
+          <p:nvPr>
+            <p:ph type="sldNum" sz="quarter" idx="10"/>
+          </p:nvPr>
+        </p:nvSpPr>
+        <p:spPr/>
+        <p:txBody>
+          <a:bodyPr/>
+          <a:lstStyle/>
+          <a:p>
+            <a:fld id="{73E9330B-B1DA-214B-A229-0CB8492B91A5}" type="slidenum">
+              <a:rPr lang="en-US" smtClean="0"/>
+              <a:t>9</a:t>
+            </a:fld>
+            <a:endParaRPr lang="en-US" dirty="0"/>
+          </a:p>
+        </p:txBody>
+      </p:sp>
+    </p:spTree>
+    <p:extLst>
+      <p:ext uri="{BB962C8B-B14F-4D97-AF65-F5344CB8AC3E}">
+        <p14:creationId xmlns:p14="http://schemas.microsoft.com/office/powerpoint/2010/main" val="4257390089"/>
       </p:ext>
     </p:extLst>
   </p:cSld>
@@ -3478,7 +4575,7 @@
     <p:bg>
       <p:bgPr>
         <a:blipFill dpi="0" rotWithShape="1">
-          <a:blip r:embed="rId2">
+          <a:blip r:embed="rId3">
             <a:lum/>
           </a:blip>
           <a:srcRect/>
@@ -3921,7 +5018,7 @@
           <p:nvPr/>
         </p:nvPicPr>
         <p:blipFill>
-          <a:blip r:embed="rId3">
+          <a:blip r:embed="rId4">
             <a:extLst>
               <a:ext uri="{28A0092B-C50C-407E-A947-70E740481C1C}">
                 <a14:useLocalDpi xmlns:a14="http://schemas.microsoft.com/office/drawing/2010/main" val="0"/>
@@ -3988,7 +5085,7 @@
           <p:nvPr/>
         </p:nvPicPr>
         <p:blipFill>
-          <a:blip r:embed="rId2">
+          <a:blip r:embed="rId3">
             <a:extLst>
               <a:ext uri="{28A0092B-C50C-407E-A947-70E740481C1C}">
                 <a14:useLocalDpi xmlns:a14="http://schemas.microsoft.com/office/drawing/2010/main" val="0"/>
@@ -4024,6 +5121,35 @@
           <a:bodyPr/>
           <a:lstStyle/>
           <a:p>
+            <a:r>
+              <a:rPr lang="en-US" dirty="0" smtClean="0"/>
+              <a:t>Sys Admin </a:t>
+            </a:r>
+            <a:r>
+              <a:rPr lang="en-US" dirty="0" smtClean="0"/>
+              <a:t>Portal</a:t>
+            </a:r>
+          </a:p>
+          <a:p>
+            <a:pPr lvl="1"/>
+            <a:r>
+              <a:rPr lang="en-US" dirty="0" smtClean="0"/>
+              <a:t>Monitor Page</a:t>
+            </a:r>
+          </a:p>
+          <a:p>
+            <a:pPr lvl="1"/>
+            <a:r>
+              <a:rPr lang="en-US" dirty="0" smtClean="0"/>
+              <a:t>Logs</a:t>
+            </a:r>
+          </a:p>
+          <a:p>
+            <a:pPr lvl="1"/>
+            <a:r>
+              <a:rPr lang="en-US" dirty="0" smtClean="0"/>
+              <a:t>Tracing</a:t>
+            </a:r>
             <a:endParaRPr lang="en-US" dirty="0"/>
           </a:p>
         </p:txBody>
@@ -4044,10 +5170,9 @@
           <a:lstStyle/>
           <a:p>
             <a:r>
-              <a:rPr lang="en-US" dirty="0" smtClean="0"/>
-              <a:t>From Development to Production</a:t>
-            </a:r>
-            <a:endParaRPr lang="en-US" dirty="0"/>
+              <a:rPr lang="en-US" dirty="0"/>
+              <a:t> Stack Monitoring</a:t>
+            </a:r>
           </a:p>
         </p:txBody>
       </p:sp>
@@ -4060,7 +5185,243 @@
           <p:nvPr/>
         </p:nvPicPr>
         <p:blipFill>
+          <a:blip r:embed="rId4">
+            <a:extLst>
+              <a:ext uri="{28A0092B-C50C-407E-A947-70E740481C1C}">
+                <a14:useLocalDpi xmlns:a14="http://schemas.microsoft.com/office/drawing/2010/main" val="0"/>
+              </a:ext>
+            </a:extLst>
+          </a:blip>
+          <a:stretch>
+            <a:fillRect/>
+          </a:stretch>
+        </p:blipFill>
+        <p:spPr>
+          <a:xfrm>
+            <a:off x="13958208" y="370333"/>
+            <a:ext cx="1486501" cy="1519852"/>
+          </a:xfrm>
+          <a:prstGeom prst="rect">
+            <a:avLst/>
+          </a:prstGeom>
+        </p:spPr>
+      </p:pic>
+      <p:pic>
+        <p:nvPicPr>
+          <p:cNvPr id="1026" name="Picture 2" descr="C:\projects\p42git\tech-summit\2014\supersize-nodejs\Monitor Page.jpg"/>
+          <p:cNvPicPr>
+            <a:picLocks noChangeAspect="1" noChangeArrowheads="1"/>
+          </p:cNvPicPr>
+          <p:nvPr/>
+        </p:nvPicPr>
+        <p:blipFill>
+          <a:blip r:embed="rId5">
+            <a:extLst>
+              <a:ext uri="{28A0092B-C50C-407E-A947-70E740481C1C}">
+                <a14:useLocalDpi xmlns:a14="http://schemas.microsoft.com/office/drawing/2010/main" val="0"/>
+              </a:ext>
+            </a:extLst>
+          </a:blip>
+          <a:srcRect/>
+          <a:stretch>
+            <a:fillRect/>
+          </a:stretch>
+        </p:blipFill>
+        <p:spPr bwMode="auto">
+          <a:xfrm>
+            <a:off x="7542891" y="1268815"/>
+            <a:ext cx="5450758" cy="6743127"/>
+          </a:xfrm>
+          <a:prstGeom prst="rect">
+            <a:avLst/>
+          </a:prstGeom>
+          <a:noFill/>
+          <a:effectLst>
+            <a:outerShdw blurRad="50800" dist="50800" dir="5400000" algn="ctr" rotWithShape="0">
+              <a:schemeClr val="tx1"/>
+            </a:outerShdw>
+          </a:effectLst>
+          <a:extLst>
+            <a:ext uri="{909E8E84-426E-40DD-AFC4-6F175D3DCCD1}">
+              <a14:hiddenFill xmlns:a14="http://schemas.microsoft.com/office/drawing/2010/main">
+                <a:solidFill>
+                  <a:srgbClr val="FFFFFF"/>
+                </a:solidFill>
+              </a14:hiddenFill>
+            </a:ext>
+          </a:extLst>
+        </p:spPr>
+      </p:pic>
+    </p:spTree>
+    <p:extLst>
+      <p:ext uri="{BB962C8B-B14F-4D97-AF65-F5344CB8AC3E}">
+        <p14:creationId xmlns:p14="http://schemas.microsoft.com/office/powerpoint/2010/main" val="2211189765"/>
+      </p:ext>
+    </p:extLst>
+  </p:cSld>
+  <p:clrMapOvr>
+    <a:masterClrMapping/>
+  </p:clrMapOvr>
+  <p:timing>
+    <p:tnLst>
+      <p:par>
+        <p:cTn id="1" dur="indefinite" restart="never" nodeType="tmRoot"/>
+      </p:par>
+    </p:tnLst>
+  </p:timing>
+</p:sld>
+</file>
+
+<file path=ppt/slides/slide11.xml><?xml version="1.0" encoding="utf-8"?>
+<p:sld xmlns:a="http://schemas.openxmlformats.org/drawingml/2006/main" xmlns:r="http://schemas.openxmlformats.org/officeDocument/2006/relationships" xmlns:p="http://schemas.openxmlformats.org/presentationml/2006/main">
+  <p:cSld>
+    <p:spTree>
+      <p:nvGrpSpPr>
+        <p:cNvPr id="1" name=""/>
+        <p:cNvGrpSpPr/>
+        <p:nvPr/>
+      </p:nvGrpSpPr>
+      <p:grpSpPr>
+        <a:xfrm>
+          <a:off x="0" y="0"/>
+          <a:ext cx="0" cy="0"/>
+          <a:chOff x="0" y="0"/>
+          <a:chExt cx="0" cy="0"/>
+        </a:xfrm>
+      </p:grpSpPr>
+      <p:pic>
+        <p:nvPicPr>
+          <p:cNvPr id="5" name="Picture 4"/>
+          <p:cNvPicPr>
+            <a:picLocks noChangeAspect="1"/>
+          </p:cNvPicPr>
+          <p:nvPr/>
+        </p:nvPicPr>
+        <p:blipFill>
           <a:blip r:embed="rId3">
+            <a:extLst>
+              <a:ext uri="{28A0092B-C50C-407E-A947-70E740481C1C}">
+                <a14:useLocalDpi xmlns:a14="http://schemas.microsoft.com/office/drawing/2010/main" val="0"/>
+              </a:ext>
+            </a:extLst>
+          </a:blip>
+          <a:stretch>
+            <a:fillRect/>
+          </a:stretch>
+        </p:blipFill>
+        <p:spPr>
+          <a:xfrm>
+            <a:off x="3703093" y="241483"/>
+            <a:ext cx="7988969" cy="8168208"/>
+          </a:xfrm>
+          <a:prstGeom prst="rect">
+            <a:avLst/>
+          </a:prstGeom>
+        </p:spPr>
+      </p:pic>
+      <p:sp>
+        <p:nvSpPr>
+          <p:cNvPr id="2" name="Content Placeholder 1"/>
+          <p:cNvSpPr>
+            <a:spLocks noGrp="1"/>
+          </p:cNvSpPr>
+          <p:nvPr>
+            <p:ph idx="1"/>
+          </p:nvPr>
+        </p:nvSpPr>
+        <p:spPr/>
+        <p:txBody>
+          <a:bodyPr/>
+          <a:lstStyle/>
+          <a:p>
+            <a:r>
+              <a:rPr lang="en-US" dirty="0" smtClean="0"/>
+              <a:t>Access the stack via a NAT</a:t>
+            </a:r>
+            <a:endParaRPr lang="en-US" dirty="0" smtClean="0"/>
+          </a:p>
+          <a:p>
+            <a:endParaRPr lang="en-US" dirty="0"/>
+          </a:p>
+          <a:p>
+            <a:r>
+              <a:rPr lang="en-US" dirty="0" smtClean="0"/>
+              <a:t>Scripts</a:t>
+            </a:r>
+          </a:p>
+          <a:p>
+            <a:pPr lvl="1"/>
+            <a:r>
+              <a:rPr lang="en-US" dirty="0" smtClean="0"/>
+              <a:t>Tunnel to any instance</a:t>
+            </a:r>
+          </a:p>
+          <a:p>
+            <a:pPr lvl="1"/>
+            <a:r>
+              <a:rPr lang="en-US" dirty="0" smtClean="0"/>
+              <a:t>Tunnel to </a:t>
+            </a:r>
+            <a:r>
+              <a:rPr lang="en-US" dirty="0" err="1" smtClean="0"/>
+              <a:t>MongoDB</a:t>
+            </a:r>
+            <a:r>
+              <a:rPr lang="en-US" dirty="0" smtClean="0"/>
+              <a:t> using </a:t>
+            </a:r>
+            <a:r>
+              <a:rPr lang="en-US" dirty="0" err="1" smtClean="0"/>
+              <a:t>RoboMongo</a:t>
+            </a:r>
+            <a:endParaRPr lang="en-US" dirty="0" smtClean="0"/>
+          </a:p>
+          <a:p>
+            <a:pPr lvl="1"/>
+            <a:r>
+              <a:rPr lang="en-US" dirty="0" smtClean="0"/>
+              <a:t>Node.js remote </a:t>
+            </a:r>
+            <a:r>
+              <a:rPr lang="en-US" dirty="0" smtClean="0"/>
+              <a:t>debugging</a:t>
+            </a:r>
+            <a:endParaRPr lang="en-US" dirty="0"/>
+          </a:p>
+        </p:txBody>
+      </p:sp>
+      <p:sp>
+        <p:nvSpPr>
+          <p:cNvPr id="3" name="Title 2"/>
+          <p:cNvSpPr>
+            <a:spLocks noGrp="1"/>
+          </p:cNvSpPr>
+          <p:nvPr>
+            <p:ph type="title"/>
+          </p:nvPr>
+        </p:nvSpPr>
+        <p:spPr/>
+        <p:txBody>
+          <a:bodyPr/>
+          <a:lstStyle/>
+          <a:p>
+            <a:r>
+              <a:rPr lang="en-US" dirty="0"/>
+              <a:t>Stack Diagnostic and Debugging</a:t>
+            </a:r>
+          </a:p>
+        </p:txBody>
+      </p:sp>
+      <p:pic>
+        <p:nvPicPr>
+          <p:cNvPr id="4" name="Content Placeholder 5"/>
+          <p:cNvPicPr>
+            <a:picLocks noChangeAspect="1"/>
+          </p:cNvPicPr>
+          <p:nvPr/>
+        </p:nvPicPr>
+        <p:blipFill>
+          <a:blip r:embed="rId4">
             <a:extLst>
               <a:ext uri="{28A0092B-C50C-407E-A947-70E740481C1C}">
                 <a14:useLocalDpi xmlns:a14="http://schemas.microsoft.com/office/drawing/2010/main" val="0"/>
@@ -4091,403 +5452,17 @@
   <p:clrMapOvr>
     <a:masterClrMapping/>
   </p:clrMapOvr>
-</p:sld>
-</file>
-
-<file path=ppt/slides/slide11.xml><?xml version="1.0" encoding="utf-8"?>
-<p:sld xmlns:a="http://schemas.openxmlformats.org/drawingml/2006/main" xmlns:r="http://schemas.openxmlformats.org/officeDocument/2006/relationships" xmlns:p="http://schemas.openxmlformats.org/presentationml/2006/main">
-  <p:cSld>
-    <p:spTree>
-      <p:nvGrpSpPr>
-        <p:cNvPr id="1" name=""/>
-        <p:cNvGrpSpPr/>
-        <p:nvPr/>
-      </p:nvGrpSpPr>
-      <p:grpSpPr>
-        <a:xfrm>
-          <a:off x="0" y="0"/>
-          <a:ext cx="0" cy="0"/>
-          <a:chOff x="0" y="0"/>
-          <a:chExt cx="0" cy="0"/>
-        </a:xfrm>
-      </p:grpSpPr>
-      <p:pic>
-        <p:nvPicPr>
-          <p:cNvPr id="5" name="Picture 4"/>
-          <p:cNvPicPr>
-            <a:picLocks noChangeAspect="1"/>
-          </p:cNvPicPr>
-          <p:nvPr/>
-        </p:nvPicPr>
-        <p:blipFill>
-          <a:blip r:embed="rId2">
-            <a:extLst>
-              <a:ext uri="{28A0092B-C50C-407E-A947-70E740481C1C}">
-                <a14:useLocalDpi xmlns:a14="http://schemas.microsoft.com/office/drawing/2010/main" val="0"/>
-              </a:ext>
-            </a:extLst>
-          </a:blip>
-          <a:stretch>
-            <a:fillRect/>
-          </a:stretch>
-        </p:blipFill>
-        <p:spPr>
-          <a:xfrm>
-            <a:off x="3703093" y="241483"/>
-            <a:ext cx="7988969" cy="8168208"/>
-          </a:xfrm>
-          <a:prstGeom prst="rect">
-            <a:avLst/>
-          </a:prstGeom>
-        </p:spPr>
-      </p:pic>
-      <p:sp>
-        <p:nvSpPr>
-          <p:cNvPr id="2" name="Content Placeholder 1"/>
-          <p:cNvSpPr>
-            <a:spLocks noGrp="1"/>
-          </p:cNvSpPr>
-          <p:nvPr>
-            <p:ph idx="1"/>
-          </p:nvPr>
-        </p:nvSpPr>
-        <p:spPr/>
-        <p:txBody>
-          <a:bodyPr/>
-          <a:lstStyle/>
-          <a:p>
-            <a:endParaRPr lang="en-US" dirty="0"/>
-          </a:p>
-        </p:txBody>
-      </p:sp>
-      <p:sp>
-        <p:nvSpPr>
-          <p:cNvPr id="3" name="Title 2"/>
-          <p:cNvSpPr>
-            <a:spLocks noGrp="1"/>
-          </p:cNvSpPr>
-          <p:nvPr>
-            <p:ph type="title"/>
-          </p:nvPr>
-        </p:nvSpPr>
-        <p:spPr/>
-        <p:txBody>
-          <a:bodyPr/>
-          <a:lstStyle/>
-          <a:p>
-            <a:r>
-              <a:rPr lang="en-US" dirty="0"/>
-              <a:t>Stack Family</a:t>
-            </a:r>
-          </a:p>
-        </p:txBody>
-      </p:sp>
-      <p:pic>
-        <p:nvPicPr>
-          <p:cNvPr id="4" name="Content Placeholder 5"/>
-          <p:cNvPicPr>
-            <a:picLocks noChangeAspect="1"/>
-          </p:cNvPicPr>
-          <p:nvPr/>
-        </p:nvPicPr>
-        <p:blipFill>
-          <a:blip r:embed="rId3">
-            <a:extLst>
-              <a:ext uri="{28A0092B-C50C-407E-A947-70E740481C1C}">
-                <a14:useLocalDpi xmlns:a14="http://schemas.microsoft.com/office/drawing/2010/main" val="0"/>
-              </a:ext>
-            </a:extLst>
-          </a:blip>
-          <a:stretch>
-            <a:fillRect/>
-          </a:stretch>
-        </p:blipFill>
-        <p:spPr>
-          <a:xfrm>
-            <a:off x="13958208" y="370333"/>
-            <a:ext cx="1486501" cy="1519852"/>
-          </a:xfrm>
-          <a:prstGeom prst="rect">
-            <a:avLst/>
-          </a:prstGeom>
-        </p:spPr>
-      </p:pic>
-    </p:spTree>
-    <p:extLst>
-      <p:ext uri="{BB962C8B-B14F-4D97-AF65-F5344CB8AC3E}">
-        <p14:creationId xmlns:p14="http://schemas.microsoft.com/office/powerpoint/2010/main" val="3241555147"/>
-      </p:ext>
-    </p:extLst>
-  </p:cSld>
-  <p:clrMapOvr>
-    <a:masterClrMapping/>
-  </p:clrMapOvr>
+  <p:timing>
+    <p:tnLst>
+      <p:par>
+        <p:cTn id="1" dur="indefinite" restart="never" nodeType="tmRoot"/>
+      </p:par>
+    </p:tnLst>
+  </p:timing>
 </p:sld>
 </file>
 
 <file path=ppt/slides/slide12.xml><?xml version="1.0" encoding="utf-8"?>
-<p:sld xmlns:a="http://schemas.openxmlformats.org/drawingml/2006/main" xmlns:r="http://schemas.openxmlformats.org/officeDocument/2006/relationships" xmlns:p="http://schemas.openxmlformats.org/presentationml/2006/main">
-  <p:cSld>
-    <p:spTree>
-      <p:nvGrpSpPr>
-        <p:cNvPr id="1" name=""/>
-        <p:cNvGrpSpPr/>
-        <p:nvPr/>
-      </p:nvGrpSpPr>
-      <p:grpSpPr>
-        <a:xfrm>
-          <a:off x="0" y="0"/>
-          <a:ext cx="0" cy="0"/>
-          <a:chOff x="0" y="0"/>
-          <a:chExt cx="0" cy="0"/>
-        </a:xfrm>
-      </p:grpSpPr>
-      <p:pic>
-        <p:nvPicPr>
-          <p:cNvPr id="5" name="Picture 4"/>
-          <p:cNvPicPr>
-            <a:picLocks noChangeAspect="1"/>
-          </p:cNvPicPr>
-          <p:nvPr/>
-        </p:nvPicPr>
-        <p:blipFill>
-          <a:blip r:embed="rId2">
-            <a:extLst>
-              <a:ext uri="{28A0092B-C50C-407E-A947-70E740481C1C}">
-                <a14:useLocalDpi xmlns:a14="http://schemas.microsoft.com/office/drawing/2010/main" val="0"/>
-              </a:ext>
-            </a:extLst>
-          </a:blip>
-          <a:stretch>
-            <a:fillRect/>
-          </a:stretch>
-        </p:blipFill>
-        <p:spPr>
-          <a:xfrm>
-            <a:off x="3703093" y="241483"/>
-            <a:ext cx="7988969" cy="8168208"/>
-          </a:xfrm>
-          <a:prstGeom prst="rect">
-            <a:avLst/>
-          </a:prstGeom>
-        </p:spPr>
-      </p:pic>
-      <p:sp>
-        <p:nvSpPr>
-          <p:cNvPr id="2" name="Content Placeholder 1"/>
-          <p:cNvSpPr>
-            <a:spLocks noGrp="1"/>
-          </p:cNvSpPr>
-          <p:nvPr>
-            <p:ph idx="1"/>
-          </p:nvPr>
-        </p:nvSpPr>
-        <p:spPr/>
-        <p:txBody>
-          <a:bodyPr/>
-          <a:lstStyle/>
-          <a:p>
-            <a:endParaRPr lang="en-US" dirty="0"/>
-          </a:p>
-        </p:txBody>
-      </p:sp>
-      <p:sp>
-        <p:nvSpPr>
-          <p:cNvPr id="3" name="Title 2"/>
-          <p:cNvSpPr>
-            <a:spLocks noGrp="1"/>
-          </p:cNvSpPr>
-          <p:nvPr>
-            <p:ph type="title"/>
-          </p:nvPr>
-        </p:nvSpPr>
-        <p:spPr/>
-        <p:txBody>
-          <a:bodyPr/>
-          <a:lstStyle/>
-          <a:p>
-            <a:r>
-              <a:rPr lang="en-US" dirty="0"/>
-              <a:t> Stack Monitoring</a:t>
-            </a:r>
-          </a:p>
-        </p:txBody>
-      </p:sp>
-      <p:pic>
-        <p:nvPicPr>
-          <p:cNvPr id="4" name="Content Placeholder 5"/>
-          <p:cNvPicPr>
-            <a:picLocks noChangeAspect="1"/>
-          </p:cNvPicPr>
-          <p:nvPr/>
-        </p:nvPicPr>
-        <p:blipFill>
-          <a:blip r:embed="rId3">
-            <a:extLst>
-              <a:ext uri="{28A0092B-C50C-407E-A947-70E740481C1C}">
-                <a14:useLocalDpi xmlns:a14="http://schemas.microsoft.com/office/drawing/2010/main" val="0"/>
-              </a:ext>
-            </a:extLst>
-          </a:blip>
-          <a:stretch>
-            <a:fillRect/>
-          </a:stretch>
-        </p:blipFill>
-        <p:spPr>
-          <a:xfrm>
-            <a:off x="13958208" y="370333"/>
-            <a:ext cx="1486501" cy="1519852"/>
-          </a:xfrm>
-          <a:prstGeom prst="rect">
-            <a:avLst/>
-          </a:prstGeom>
-        </p:spPr>
-      </p:pic>
-    </p:spTree>
-    <p:extLst>
-      <p:ext uri="{BB962C8B-B14F-4D97-AF65-F5344CB8AC3E}">
-        <p14:creationId xmlns:p14="http://schemas.microsoft.com/office/powerpoint/2010/main" val="2211189765"/>
-      </p:ext>
-    </p:extLst>
-  </p:cSld>
-  <p:clrMapOvr>
-    <a:masterClrMapping/>
-  </p:clrMapOvr>
-</p:sld>
-</file>
-
-<file path=ppt/slides/slide13.xml><?xml version="1.0" encoding="utf-8"?>
-<p:sld xmlns:a="http://schemas.openxmlformats.org/drawingml/2006/main" xmlns:r="http://schemas.openxmlformats.org/officeDocument/2006/relationships" xmlns:p="http://schemas.openxmlformats.org/presentationml/2006/main">
-  <p:cSld>
-    <p:spTree>
-      <p:nvGrpSpPr>
-        <p:cNvPr id="1" name=""/>
-        <p:cNvGrpSpPr/>
-        <p:nvPr/>
-      </p:nvGrpSpPr>
-      <p:grpSpPr>
-        <a:xfrm>
-          <a:off x="0" y="0"/>
-          <a:ext cx="0" cy="0"/>
-          <a:chOff x="0" y="0"/>
-          <a:chExt cx="0" cy="0"/>
-        </a:xfrm>
-      </p:grpSpPr>
-      <p:pic>
-        <p:nvPicPr>
-          <p:cNvPr id="5" name="Picture 4"/>
-          <p:cNvPicPr>
-            <a:picLocks noChangeAspect="1"/>
-          </p:cNvPicPr>
-          <p:nvPr/>
-        </p:nvPicPr>
-        <p:blipFill>
-          <a:blip r:embed="rId2">
-            <a:extLst>
-              <a:ext uri="{28A0092B-C50C-407E-A947-70E740481C1C}">
-                <a14:useLocalDpi xmlns:a14="http://schemas.microsoft.com/office/drawing/2010/main" val="0"/>
-              </a:ext>
-            </a:extLst>
-          </a:blip>
-          <a:stretch>
-            <a:fillRect/>
-          </a:stretch>
-        </p:blipFill>
-        <p:spPr>
-          <a:xfrm>
-            <a:off x="3703093" y="241483"/>
-            <a:ext cx="7988969" cy="8168208"/>
-          </a:xfrm>
-          <a:prstGeom prst="rect">
-            <a:avLst/>
-          </a:prstGeom>
-        </p:spPr>
-      </p:pic>
-      <p:sp>
-        <p:nvSpPr>
-          <p:cNvPr id="2" name="Content Placeholder 1"/>
-          <p:cNvSpPr>
-            <a:spLocks noGrp="1"/>
-          </p:cNvSpPr>
-          <p:nvPr>
-            <p:ph idx="1"/>
-          </p:nvPr>
-        </p:nvSpPr>
-        <p:spPr/>
-        <p:txBody>
-          <a:bodyPr/>
-          <a:lstStyle/>
-          <a:p>
-            <a:endParaRPr lang="en-US" dirty="0"/>
-          </a:p>
-        </p:txBody>
-      </p:sp>
-      <p:sp>
-        <p:nvSpPr>
-          <p:cNvPr id="3" name="Title 2"/>
-          <p:cNvSpPr>
-            <a:spLocks noGrp="1"/>
-          </p:cNvSpPr>
-          <p:nvPr>
-            <p:ph type="title"/>
-          </p:nvPr>
-        </p:nvSpPr>
-        <p:spPr/>
-        <p:txBody>
-          <a:bodyPr/>
-          <a:lstStyle/>
-          <a:p>
-            <a:r>
-              <a:rPr lang="en-US" dirty="0"/>
-              <a:t>Stack Diagnostic and Debugging</a:t>
-            </a:r>
-          </a:p>
-        </p:txBody>
-      </p:sp>
-      <p:pic>
-        <p:nvPicPr>
-          <p:cNvPr id="4" name="Content Placeholder 5"/>
-          <p:cNvPicPr>
-            <a:picLocks noChangeAspect="1"/>
-          </p:cNvPicPr>
-          <p:nvPr/>
-        </p:nvPicPr>
-        <p:blipFill>
-          <a:blip r:embed="rId3">
-            <a:extLst>
-              <a:ext uri="{28A0092B-C50C-407E-A947-70E740481C1C}">
-                <a14:useLocalDpi xmlns:a14="http://schemas.microsoft.com/office/drawing/2010/main" val="0"/>
-              </a:ext>
-            </a:extLst>
-          </a:blip>
-          <a:stretch>
-            <a:fillRect/>
-          </a:stretch>
-        </p:blipFill>
-        <p:spPr>
-          <a:xfrm>
-            <a:off x="13958208" y="370333"/>
-            <a:ext cx="1486501" cy="1519852"/>
-          </a:xfrm>
-          <a:prstGeom prst="rect">
-            <a:avLst/>
-          </a:prstGeom>
-        </p:spPr>
-      </p:pic>
-    </p:spTree>
-    <p:extLst>
-      <p:ext uri="{BB962C8B-B14F-4D97-AF65-F5344CB8AC3E}">
-        <p14:creationId xmlns:p14="http://schemas.microsoft.com/office/powerpoint/2010/main" val="2211189765"/>
-      </p:ext>
-    </p:extLst>
-  </p:cSld>
-  <p:clrMapOvr>
-    <a:masterClrMapping/>
-  </p:clrMapOvr>
-</p:sld>
-</file>
-
-<file path=ppt/slides/slide14.xml><?xml version="1.0" encoding="utf-8"?>
 <p:sld xmlns:a="http://schemas.openxmlformats.org/drawingml/2006/main" xmlns:r="http://schemas.openxmlformats.org/officeDocument/2006/relationships" xmlns:p="http://schemas.openxmlformats.org/presentationml/2006/main">
   <p:cSld>
     <p:spTree>
@@ -4514,6 +5489,13 @@
   <p:clrMapOvr>
     <a:masterClrMapping/>
   </p:clrMapOvr>
+  <p:timing>
+    <p:tnLst>
+      <p:par>
+        <p:cTn id="1" dur="indefinite" restart="never" nodeType="tmRoot"/>
+      </p:par>
+    </p:tnLst>
+  </p:timing>
 </p:sld>
 </file>
 
@@ -4543,7 +5525,7 @@
           <p:nvPr/>
         </p:nvPicPr>
         <p:blipFill>
-          <a:blip r:embed="rId2">
+          <a:blip r:embed="rId3">
             <a:extLst>
               <a:ext uri="{28A0092B-C50C-407E-A947-70E740481C1C}">
                 <a14:useLocalDpi xmlns:a14="http://schemas.microsoft.com/office/drawing/2010/main" val="0"/>
@@ -4599,10 +5581,9 @@
           <a:lstStyle/>
           <a:p>
             <a:r>
-              <a:rPr lang="en-US" dirty="0" smtClean="0"/>
-              <a:t>M&amp;E Cloud Services - Context</a:t>
-            </a:r>
-            <a:endParaRPr lang="en-US" dirty="0"/>
+              <a:rPr lang="en-US" dirty="0"/>
+              <a:t>Deployment</a:t>
+            </a:r>
           </a:p>
         </p:txBody>
       </p:sp>
@@ -4615,7 +5596,7 @@
           <p:nvPr/>
         </p:nvPicPr>
         <p:blipFill>
-          <a:blip r:embed="rId3">
+          <a:blip r:embed="rId4">
             <a:extLst>
               <a:ext uri="{28A0092B-C50C-407E-A947-70E740481C1C}">
                 <a14:useLocalDpi xmlns:a14="http://schemas.microsoft.com/office/drawing/2010/main" val="0"/>
@@ -4639,7 +5620,7 @@
     </p:spTree>
     <p:extLst>
       <p:ext uri="{BB962C8B-B14F-4D97-AF65-F5344CB8AC3E}">
-        <p14:creationId xmlns:p14="http://schemas.microsoft.com/office/powerpoint/2010/main" val="927485778"/>
+        <p14:creationId xmlns:p14="http://schemas.microsoft.com/office/powerpoint/2010/main" val="2823306500"/>
       </p:ext>
     </p:extLst>
   </p:cSld>
@@ -4675,7 +5656,7 @@
           <p:nvPr/>
         </p:nvPicPr>
         <p:blipFill>
-          <a:blip r:embed="rId2">
+          <a:blip r:embed="rId3">
             <a:extLst>
               <a:ext uri="{28A0092B-C50C-407E-A947-70E740481C1C}">
                 <a14:useLocalDpi xmlns:a14="http://schemas.microsoft.com/office/drawing/2010/main" val="0"/>
@@ -4711,6 +5692,41 @@
           <a:bodyPr/>
           <a:lstStyle/>
           <a:p>
+            <a:r>
+              <a:rPr lang="en-US" dirty="0" smtClean="0"/>
+              <a:t>Everything in source control</a:t>
+            </a:r>
+          </a:p>
+          <a:p>
+            <a:endParaRPr lang="en-US" dirty="0" smtClean="0"/>
+          </a:p>
+          <a:p>
+            <a:r>
+              <a:rPr lang="en-US" dirty="0" smtClean="0"/>
+              <a:t>Sync and deploy</a:t>
+            </a:r>
+          </a:p>
+          <a:p>
+            <a:endParaRPr lang="en-US" dirty="0" smtClean="0"/>
+          </a:p>
+          <a:p>
+            <a:r>
+              <a:rPr lang="en-US" dirty="0" smtClean="0"/>
+              <a:t>Use a different repository from the code</a:t>
+            </a:r>
+          </a:p>
+          <a:p>
+            <a:endParaRPr lang="en-US" dirty="0" smtClean="0"/>
+          </a:p>
+          <a:p>
+            <a:r>
+              <a:rPr lang="en-US" dirty="0" smtClean="0"/>
+              <a:t>Branch </a:t>
+            </a:r>
+            <a:r>
+              <a:rPr lang="en-US" dirty="0" smtClean="0"/>
+              <a:t>and tag deployment repository</a:t>
+            </a:r>
             <a:endParaRPr lang="en-US" dirty="0"/>
           </a:p>
         </p:txBody>
@@ -4732,7 +5748,7 @@
           <a:p>
             <a:r>
               <a:rPr lang="en-US" dirty="0"/>
-              <a:t>Deployment</a:t>
+              <a:t>Deployment as code</a:t>
             </a:r>
           </a:p>
         </p:txBody>
@@ -4746,7 +5762,7 @@
           <p:nvPr/>
         </p:nvPicPr>
         <p:blipFill>
-          <a:blip r:embed="rId3">
+          <a:blip r:embed="rId4">
             <a:extLst>
               <a:ext uri="{28A0092B-C50C-407E-A947-70E740481C1C}">
                 <a14:useLocalDpi xmlns:a14="http://schemas.microsoft.com/office/drawing/2010/main" val="0"/>
@@ -4770,7 +5786,7 @@
     </p:spTree>
     <p:extLst>
       <p:ext uri="{BB962C8B-B14F-4D97-AF65-F5344CB8AC3E}">
-        <p14:creationId xmlns:p14="http://schemas.microsoft.com/office/powerpoint/2010/main" val="2823306500"/>
+        <p14:creationId xmlns:p14="http://schemas.microsoft.com/office/powerpoint/2010/main" val="4129277108"/>
       </p:ext>
     </p:extLst>
   </p:cSld>
@@ -4806,7 +5822,7 @@
           <p:nvPr/>
         </p:nvPicPr>
         <p:blipFill>
-          <a:blip r:embed="rId2">
+          <a:blip r:embed="rId3">
             <a:extLst>
               <a:ext uri="{28A0092B-C50C-407E-A947-70E740481C1C}">
                 <a14:useLocalDpi xmlns:a14="http://schemas.microsoft.com/office/drawing/2010/main" val="0"/>
@@ -4844,25 +5860,33 @@
           <a:p>
             <a:r>
               <a:rPr lang="en-US" dirty="0" smtClean="0"/>
-              <a:t>Everything in source control</a:t>
-            </a:r>
-          </a:p>
-          <a:p>
-            <a:endParaRPr lang="en-US" dirty="0" smtClean="0"/>
+              <a:t>JSON file</a:t>
+            </a:r>
+          </a:p>
+          <a:p>
+            <a:endParaRPr lang="en-US" dirty="0"/>
           </a:p>
           <a:p>
             <a:r>
               <a:rPr lang="en-US" dirty="0" smtClean="0"/>
-              <a:t>Sync and deploy</a:t>
-            </a:r>
-          </a:p>
-          <a:p>
-            <a:endParaRPr lang="en-US" dirty="0" smtClean="0"/>
+              <a:t>File generation</a:t>
+            </a:r>
+          </a:p>
+          <a:p>
+            <a:endParaRPr lang="en-US" dirty="0"/>
           </a:p>
           <a:p>
             <a:r>
               <a:rPr lang="en-US" dirty="0" smtClean="0"/>
-              <a:t>Different repository that the code</a:t>
+              <a:t>Create and </a:t>
+            </a:r>
+            <a:r>
+              <a:rPr lang="en-US" dirty="0"/>
+              <a:t>d</a:t>
+            </a:r>
+            <a:r>
+              <a:rPr lang="en-US" dirty="0" smtClean="0"/>
+              <a:t>elete stack</a:t>
             </a:r>
           </a:p>
           <a:p>
@@ -4871,7 +5895,7 @@
           <a:p>
             <a:r>
               <a:rPr lang="en-US" dirty="0" smtClean="0"/>
-              <a:t>Branch and tag deployment repository</a:t>
+              <a:t>Update existing stack</a:t>
             </a:r>
             <a:endParaRPr lang="en-US" dirty="0"/>
           </a:p>
@@ -4894,7 +5918,7 @@
           <a:p>
             <a:r>
               <a:rPr lang="en-US" dirty="0"/>
-              <a:t>Deployment as code</a:t>
+              <a:t>Cloud Formation</a:t>
             </a:r>
           </a:p>
         </p:txBody>
@@ -4908,7 +5932,7 @@
           <p:nvPr/>
         </p:nvPicPr>
         <p:blipFill>
-          <a:blip r:embed="rId3">
+          <a:blip r:embed="rId4">
             <a:extLst>
               <a:ext uri="{28A0092B-C50C-407E-A947-70E740481C1C}">
                 <a14:useLocalDpi xmlns:a14="http://schemas.microsoft.com/office/drawing/2010/main" val="0"/>
@@ -4943,184 +5967,6 @@
 </file>
 
 <file path=ppt/slides/slide5.xml><?xml version="1.0" encoding="utf-8"?>
-<p:sld xmlns:a="http://schemas.openxmlformats.org/drawingml/2006/main" xmlns:r="http://schemas.openxmlformats.org/officeDocument/2006/relationships" xmlns:p="http://schemas.openxmlformats.org/presentationml/2006/main">
-  <p:cSld>
-    <p:spTree>
-      <p:nvGrpSpPr>
-        <p:cNvPr id="1" name=""/>
-        <p:cNvGrpSpPr/>
-        <p:nvPr/>
-      </p:nvGrpSpPr>
-      <p:grpSpPr>
-        <a:xfrm>
-          <a:off x="0" y="0"/>
-          <a:ext cx="0" cy="0"/>
-          <a:chOff x="0" y="0"/>
-          <a:chExt cx="0" cy="0"/>
-        </a:xfrm>
-      </p:grpSpPr>
-      <p:pic>
-        <p:nvPicPr>
-          <p:cNvPr id="5" name="Picture 4"/>
-          <p:cNvPicPr>
-            <a:picLocks noChangeAspect="1"/>
-          </p:cNvPicPr>
-          <p:nvPr/>
-        </p:nvPicPr>
-        <p:blipFill>
-          <a:blip r:embed="rId2">
-            <a:extLst>
-              <a:ext uri="{28A0092B-C50C-407E-A947-70E740481C1C}">
-                <a14:useLocalDpi xmlns:a14="http://schemas.microsoft.com/office/drawing/2010/main" val="0"/>
-              </a:ext>
-            </a:extLst>
-          </a:blip>
-          <a:stretch>
-            <a:fillRect/>
-          </a:stretch>
-        </p:blipFill>
-        <p:spPr>
-          <a:xfrm>
-            <a:off x="3703093" y="241483"/>
-            <a:ext cx="7988969" cy="8168208"/>
-          </a:xfrm>
-          <a:prstGeom prst="rect">
-            <a:avLst/>
-          </a:prstGeom>
-        </p:spPr>
-      </p:pic>
-      <p:sp>
-        <p:nvSpPr>
-          <p:cNvPr id="2" name="Content Placeholder 1"/>
-          <p:cNvSpPr>
-            <a:spLocks noGrp="1"/>
-          </p:cNvSpPr>
-          <p:nvPr>
-            <p:ph idx="1"/>
-          </p:nvPr>
-        </p:nvSpPr>
-        <p:spPr/>
-        <p:txBody>
-          <a:bodyPr/>
-          <a:lstStyle/>
-          <a:p>
-            <a:r>
-              <a:rPr lang="en-US" dirty="0" smtClean="0"/>
-              <a:t>JSON</a:t>
-            </a:r>
-            <a:r>
-              <a:rPr lang="en-US" dirty="0" smtClean="0"/>
-              <a:t> </a:t>
-            </a:r>
-            <a:r>
-              <a:rPr lang="en-US" dirty="0" smtClean="0"/>
-              <a:t>file</a:t>
-            </a:r>
-          </a:p>
-          <a:p>
-            <a:endParaRPr lang="en-US" dirty="0"/>
-          </a:p>
-          <a:p>
-            <a:r>
-              <a:rPr lang="en-US" dirty="0" smtClean="0"/>
-              <a:t>File generation</a:t>
-            </a:r>
-          </a:p>
-          <a:p>
-            <a:endParaRPr lang="en-US" dirty="0"/>
-          </a:p>
-          <a:p>
-            <a:r>
-              <a:rPr lang="en-US" dirty="0" smtClean="0"/>
-              <a:t>Create and </a:t>
-            </a:r>
-            <a:r>
-              <a:rPr lang="en-US" dirty="0"/>
-              <a:t>d</a:t>
-            </a:r>
-            <a:r>
-              <a:rPr lang="en-US" dirty="0" smtClean="0"/>
-              <a:t>elete stack</a:t>
-            </a:r>
-          </a:p>
-          <a:p>
-            <a:endParaRPr lang="en-US" dirty="0"/>
-          </a:p>
-          <a:p>
-            <a:r>
-              <a:rPr lang="en-US" dirty="0" smtClean="0"/>
-              <a:t>Update existing stack</a:t>
-            </a:r>
-            <a:endParaRPr lang="en-US" dirty="0"/>
-          </a:p>
-        </p:txBody>
-      </p:sp>
-      <p:sp>
-        <p:nvSpPr>
-          <p:cNvPr id="3" name="Title 2"/>
-          <p:cNvSpPr>
-            <a:spLocks noGrp="1"/>
-          </p:cNvSpPr>
-          <p:nvPr>
-            <p:ph type="title"/>
-          </p:nvPr>
-        </p:nvSpPr>
-        <p:spPr/>
-        <p:txBody>
-          <a:bodyPr/>
-          <a:lstStyle/>
-          <a:p>
-            <a:r>
-              <a:rPr lang="en-US" dirty="0"/>
-              <a:t>Cloud Formation</a:t>
-            </a:r>
-          </a:p>
-        </p:txBody>
-      </p:sp>
-      <p:pic>
-        <p:nvPicPr>
-          <p:cNvPr id="4" name="Content Placeholder 5"/>
-          <p:cNvPicPr>
-            <a:picLocks noChangeAspect="1"/>
-          </p:cNvPicPr>
-          <p:nvPr/>
-        </p:nvPicPr>
-        <p:blipFill>
-          <a:blip r:embed="rId3">
-            <a:extLst>
-              <a:ext uri="{28A0092B-C50C-407E-A947-70E740481C1C}">
-                <a14:useLocalDpi xmlns:a14="http://schemas.microsoft.com/office/drawing/2010/main" val="0"/>
-              </a:ext>
-            </a:extLst>
-          </a:blip>
-          <a:stretch>
-            <a:fillRect/>
-          </a:stretch>
-        </p:blipFill>
-        <p:spPr>
-          <a:xfrm>
-            <a:off x="13958208" y="370333"/>
-            <a:ext cx="1486501" cy="1519852"/>
-          </a:xfrm>
-          <a:prstGeom prst="rect">
-            <a:avLst/>
-          </a:prstGeom>
-        </p:spPr>
-      </p:pic>
-    </p:spTree>
-    <p:extLst>
-      <p:ext uri="{BB962C8B-B14F-4D97-AF65-F5344CB8AC3E}">
-        <p14:creationId xmlns:p14="http://schemas.microsoft.com/office/powerpoint/2010/main" val="4129277108"/>
-      </p:ext>
-    </p:extLst>
-  </p:cSld>
-  <p:clrMapOvr>
-    <a:masterClrMapping/>
-  </p:clrMapOvr>
-</p:sld>
-</file>
-
-<file path=ppt/slides/slide6.xml><?xml version="1.0" encoding="utf-8"?>
 <p:sld xmlns:a="http://schemas.openxmlformats.org/drawingml/2006/main" xmlns:r="http://schemas.openxmlformats.org/officeDocument/2006/relationships" xmlns:p="http://schemas.openxmlformats.org/presentationml/2006/main">
   <p:cSld>
     <p:spTree>
@@ -5270,10 +6116,17 @@
   <p:clrMapOvr>
     <a:masterClrMapping/>
   </p:clrMapOvr>
+  <p:timing>
+    <p:tnLst>
+      <p:par>
+        <p:cTn id="1" dur="indefinite" restart="never" nodeType="tmRoot"/>
+      </p:par>
+    </p:tnLst>
+  </p:timing>
 </p:sld>
 </file>
 
-<file path=ppt/slides/slide7.xml><?xml version="1.0" encoding="utf-8"?>
+<file path=ppt/slides/slide6.xml><?xml version="1.0" encoding="utf-8"?>
 <p:sld xmlns:a="http://schemas.openxmlformats.org/drawingml/2006/main" xmlns:r="http://schemas.openxmlformats.org/officeDocument/2006/relationships" xmlns:p="http://schemas.openxmlformats.org/presentationml/2006/main">
   <p:cSld>
     <p:spTree>
@@ -5299,7 +6152,7 @@
           <p:nvPr/>
         </p:nvPicPr>
         <p:blipFill>
-          <a:blip r:embed="rId2">
+          <a:blip r:embed="rId3">
             <a:extLst>
               <a:ext uri="{28A0092B-C50C-407E-A947-70E740481C1C}">
                 <a14:useLocalDpi xmlns:a14="http://schemas.microsoft.com/office/drawing/2010/main" val="0"/>
@@ -5348,6 +6201,15 @@
               <a:rPr lang="en-US" dirty="0" smtClean="0"/>
               <a:t>Upstart</a:t>
             </a:r>
+          </a:p>
+          <a:p>
+            <a:endParaRPr lang="en-US" dirty="0"/>
+          </a:p>
+          <a:p>
+            <a:r>
+              <a:rPr lang="en-US" dirty="0" smtClean="0"/>
+              <a:t>Vagrant</a:t>
+            </a:r>
             <a:endParaRPr lang="en-US" dirty="0"/>
           </a:p>
         </p:txBody>
@@ -5383,7 +6245,7 @@
           <p:nvPr/>
         </p:nvPicPr>
         <p:blipFill>
-          <a:blip r:embed="rId3">
+          <a:blip r:embed="rId4">
             <a:extLst>
               <a:ext uri="{28A0092B-C50C-407E-A947-70E740481C1C}">
                 <a14:useLocalDpi xmlns:a14="http://schemas.microsoft.com/office/drawing/2010/main" val="0"/>
@@ -5404,6 +6266,47 @@
           </a:prstGeom>
         </p:spPr>
       </p:pic>
+      <p:pic>
+        <p:nvPicPr>
+          <p:cNvPr id="2050" name="Picture 2" descr="C:\projects\p42git\tech-summit\2014\supersize-nodejs\logo-chef.png"/>
+          <p:cNvPicPr>
+            <a:picLocks noChangeAspect="1" noChangeArrowheads="1"/>
+          </p:cNvPicPr>
+          <p:nvPr/>
+        </p:nvPicPr>
+        <p:blipFill>
+          <a:blip r:embed="rId5">
+            <a:extLst>
+              <a:ext uri="{28A0092B-C50C-407E-A947-70E740481C1C}">
+                <a14:useLocalDpi xmlns:a14="http://schemas.microsoft.com/office/drawing/2010/main" val="0"/>
+              </a:ext>
+            </a:extLst>
+          </a:blip>
+          <a:srcRect/>
+          <a:stretch>
+            <a:fillRect/>
+          </a:stretch>
+        </p:blipFill>
+        <p:spPr bwMode="auto">
+          <a:xfrm>
+            <a:off x="9136063" y="3624263"/>
+            <a:ext cx="1905000" cy="1476375"/>
+          </a:xfrm>
+          <a:prstGeom prst="rect">
+            <a:avLst/>
+          </a:prstGeom>
+          <a:noFill/>
+          <a:extLst>
+            <a:ext uri="{909E8E84-426E-40DD-AFC4-6F175D3DCCD1}">
+              <a14:hiddenFill xmlns:a14="http://schemas.microsoft.com/office/drawing/2010/main">
+                <a:solidFill>
+                  <a:srgbClr val="FFFFFF"/>
+                </a:solidFill>
+              </a14:hiddenFill>
+            </a:ext>
+          </a:extLst>
+        </p:spPr>
+      </p:pic>
     </p:spTree>
     <p:extLst>
       <p:ext uri="{BB962C8B-B14F-4D97-AF65-F5344CB8AC3E}">
@@ -5414,10 +6317,17 @@
   <p:clrMapOvr>
     <a:masterClrMapping/>
   </p:clrMapOvr>
+  <p:timing>
+    <p:tnLst>
+      <p:par>
+        <p:cTn id="1" dur="indefinite" restart="never" nodeType="tmRoot"/>
+      </p:par>
+    </p:tnLst>
+  </p:timing>
 </p:sld>
 </file>
 
-<file path=ppt/slides/slide8.xml><?xml version="1.0" encoding="utf-8"?>
+<file path=ppt/slides/slide7.xml><?xml version="1.0" encoding="utf-8"?>
 <p:sld xmlns:a="http://schemas.openxmlformats.org/drawingml/2006/main" xmlns:r="http://schemas.openxmlformats.org/officeDocument/2006/relationships" xmlns:p="http://schemas.openxmlformats.org/presentationml/2006/main">
   <p:cSld>
     <p:spTree>
@@ -5591,6 +6501,152 @@
   <p:clrMapOvr>
     <a:masterClrMapping/>
   </p:clrMapOvr>
+  <p:timing>
+    <p:tnLst>
+      <p:par>
+        <p:cTn id="1" dur="indefinite" restart="never" nodeType="tmRoot"/>
+      </p:par>
+    </p:tnLst>
+  </p:timing>
+</p:sld>
+</file>
+
+<file path=ppt/slides/slide8.xml><?xml version="1.0" encoding="utf-8"?>
+<p:sld xmlns:a="http://schemas.openxmlformats.org/drawingml/2006/main" xmlns:r="http://schemas.openxmlformats.org/officeDocument/2006/relationships" xmlns:p="http://schemas.openxmlformats.org/presentationml/2006/main">
+  <p:cSld>
+    <p:spTree>
+      <p:nvGrpSpPr>
+        <p:cNvPr id="1" name=""/>
+        <p:cNvGrpSpPr/>
+        <p:nvPr/>
+      </p:nvGrpSpPr>
+      <p:grpSpPr>
+        <a:xfrm>
+          <a:off x="0" y="0"/>
+          <a:ext cx="0" cy="0"/>
+          <a:chOff x="0" y="0"/>
+          <a:chExt cx="0" cy="0"/>
+        </a:xfrm>
+      </p:grpSpPr>
+      <p:pic>
+        <p:nvPicPr>
+          <p:cNvPr id="5" name="Picture 4"/>
+          <p:cNvPicPr>
+            <a:picLocks noChangeAspect="1"/>
+          </p:cNvPicPr>
+          <p:nvPr/>
+        </p:nvPicPr>
+        <p:blipFill>
+          <a:blip r:embed="rId3">
+            <a:extLst>
+              <a:ext uri="{28A0092B-C50C-407E-A947-70E740481C1C}">
+                <a14:useLocalDpi xmlns:a14="http://schemas.microsoft.com/office/drawing/2010/main" val="0"/>
+              </a:ext>
+            </a:extLst>
+          </a:blip>
+          <a:stretch>
+            <a:fillRect/>
+          </a:stretch>
+        </p:blipFill>
+        <p:spPr>
+          <a:xfrm>
+            <a:off x="3703093" y="241483"/>
+            <a:ext cx="7988969" cy="8168208"/>
+          </a:xfrm>
+          <a:prstGeom prst="rect">
+            <a:avLst/>
+          </a:prstGeom>
+        </p:spPr>
+      </p:pic>
+      <p:sp>
+        <p:nvSpPr>
+          <p:cNvPr id="2" name="Content Placeholder 1"/>
+          <p:cNvSpPr>
+            <a:spLocks noGrp="1"/>
+          </p:cNvSpPr>
+          <p:nvPr>
+            <p:ph idx="1"/>
+          </p:nvPr>
+        </p:nvSpPr>
+        <p:spPr/>
+        <p:txBody>
+          <a:bodyPr/>
+          <a:lstStyle/>
+          <a:p>
+            <a:endParaRPr lang="en-US" dirty="0"/>
+          </a:p>
+        </p:txBody>
+      </p:sp>
+      <p:sp>
+        <p:nvSpPr>
+          <p:cNvPr id="3" name="Title 2"/>
+          <p:cNvSpPr>
+            <a:spLocks noGrp="1"/>
+          </p:cNvSpPr>
+          <p:nvPr>
+            <p:ph type="title"/>
+          </p:nvPr>
+        </p:nvSpPr>
+        <p:spPr/>
+        <p:txBody>
+          <a:bodyPr/>
+          <a:lstStyle/>
+          <a:p>
+            <a:r>
+              <a:rPr lang="en-US" dirty="0" smtClean="0"/>
+              <a:t>From Development to Production</a:t>
+            </a:r>
+            <a:endParaRPr lang="en-US" dirty="0"/>
+          </a:p>
+        </p:txBody>
+      </p:sp>
+      <p:pic>
+        <p:nvPicPr>
+          <p:cNvPr id="4" name="Content Placeholder 5"/>
+          <p:cNvPicPr>
+            <a:picLocks noChangeAspect="1"/>
+          </p:cNvPicPr>
+          <p:nvPr/>
+        </p:nvPicPr>
+        <p:blipFill>
+          <a:blip r:embed="rId4">
+            <a:extLst>
+              <a:ext uri="{28A0092B-C50C-407E-A947-70E740481C1C}">
+                <a14:useLocalDpi xmlns:a14="http://schemas.microsoft.com/office/drawing/2010/main" val="0"/>
+              </a:ext>
+            </a:extLst>
+          </a:blip>
+          <a:stretch>
+            <a:fillRect/>
+          </a:stretch>
+        </p:blipFill>
+        <p:spPr>
+          <a:xfrm>
+            <a:off x="13958208" y="370333"/>
+            <a:ext cx="1486501" cy="1519852"/>
+          </a:xfrm>
+          <a:prstGeom prst="rect">
+            <a:avLst/>
+          </a:prstGeom>
+        </p:spPr>
+      </p:pic>
+    </p:spTree>
+    <p:extLst>
+      <p:ext uri="{BB962C8B-B14F-4D97-AF65-F5344CB8AC3E}">
+        <p14:creationId xmlns:p14="http://schemas.microsoft.com/office/powerpoint/2010/main" val="2211189765"/>
+      </p:ext>
+    </p:extLst>
+  </p:cSld>
+  <p:clrMapOvr>
+    <a:masterClrMapping/>
+  </p:clrMapOvr>
+  <p:timing>
+    <p:tnLst>
+      <p:par>
+        <p:cTn id="1" dur="indefinite" restart="never" nodeType="tmRoot"/>
+      </p:par>
+    </p:tnLst>
+  </p:timing>
 </p:sld>
 </file>
 
@@ -5620,7 +6676,7 @@
           <p:nvPr/>
         </p:nvPicPr>
         <p:blipFill>
-          <a:blip r:embed="rId2">
+          <a:blip r:embed="rId3">
             <a:extLst>
               <a:ext uri="{28A0092B-C50C-407E-A947-70E740481C1C}">
                 <a14:useLocalDpi xmlns:a14="http://schemas.microsoft.com/office/drawing/2010/main" val="0"/>
@@ -5643,31 +6699,6 @@
       </p:pic>
       <p:sp>
         <p:nvSpPr>
-          <p:cNvPr id="2" name="Content Placeholder 1"/>
-          <p:cNvSpPr>
-            <a:spLocks noGrp="1"/>
-          </p:cNvSpPr>
-          <p:nvPr>
-            <p:ph idx="1"/>
-          </p:nvPr>
-        </p:nvSpPr>
-        <p:spPr/>
-        <p:txBody>
-          <a:bodyPr/>
-          <a:lstStyle/>
-          <a:p>
-            <a:r>
-              <a:rPr lang="en-US" dirty="0"/>
-              <a:t>Great way to quickly test Chef cookbooks</a:t>
-            </a:r>
-          </a:p>
-          <a:p>
-            <a:endParaRPr lang="en-US" dirty="0"/>
-          </a:p>
-        </p:txBody>
-      </p:sp>
-      <p:sp>
-        <p:nvSpPr>
           <p:cNvPr id="3" name="Title 2"/>
           <p:cNvSpPr>
             <a:spLocks noGrp="1"/>
@@ -5682,10 +6713,9 @@
           <a:lstStyle/>
           <a:p>
             <a:r>
-              <a:rPr lang="en-US" dirty="0" smtClean="0"/>
-              <a:t>Vagrant</a:t>
-            </a:r>
-            <a:endParaRPr lang="en-US" dirty="0"/>
+              <a:rPr lang="en-US" dirty="0"/>
+              <a:t>Stack Family</a:t>
+            </a:r>
           </a:p>
         </p:txBody>
       </p:sp>
@@ -5698,7 +6728,7 @@
           <p:nvPr/>
         </p:nvPicPr>
         <p:blipFill>
-          <a:blip r:embed="rId3">
+          <a:blip r:embed="rId4">
             <a:extLst>
               <a:ext uri="{28A0092B-C50C-407E-A947-70E740481C1C}">
                 <a14:useLocalDpi xmlns:a14="http://schemas.microsoft.com/office/drawing/2010/main" val="0"/>
@@ -5719,16 +6749,87 @@
           </a:prstGeom>
         </p:spPr>
       </p:pic>
+      <p:pic>
+        <p:nvPicPr>
+          <p:cNvPr id="1028" name="Picture 4"/>
+          <p:cNvPicPr>
+            <a:picLocks noChangeAspect="1" noChangeArrowheads="1"/>
+          </p:cNvPicPr>
+          <p:nvPr/>
+        </p:nvPicPr>
+        <p:blipFill>
+          <a:blip r:embed="rId5">
+            <a:extLst>
+              <a:ext uri="{28A0092B-C50C-407E-A947-70E740481C1C}">
+                <a14:useLocalDpi xmlns:a14="http://schemas.microsoft.com/office/drawing/2010/main" val="0"/>
+              </a:ext>
+            </a:extLst>
+          </a:blip>
+          <a:srcRect/>
+          <a:stretch>
+            <a:fillRect/>
+          </a:stretch>
+        </p:blipFill>
+        <p:spPr bwMode="auto">
+          <a:xfrm>
+            <a:off x="4463839" y="1890186"/>
+            <a:ext cx="7453341" cy="6432486"/>
+          </a:xfrm>
+          <a:prstGeom prst="rect">
+            <a:avLst/>
+          </a:prstGeom>
+          <a:noFill/>
+          <a:ln>
+            <a:noFill/>
+          </a:ln>
+          <a:effectLst/>
+          <a:extLst>
+            <a:ext uri="{909E8E84-426E-40DD-AFC4-6F175D3DCCD1}">
+              <a14:hiddenFill xmlns:a14="http://schemas.microsoft.com/office/drawing/2010/main">
+                <a:solidFill>
+                  <a:schemeClr val="accent1"/>
+                </a:solidFill>
+              </a14:hiddenFill>
+            </a:ext>
+            <a:ext uri="{91240B29-F687-4F45-9708-019B960494DF}">
+              <a14:hiddenLine xmlns:a14="http://schemas.microsoft.com/office/drawing/2010/main" w="9525">
+                <a:solidFill>
+                  <a:schemeClr val="tx1"/>
+                </a:solidFill>
+                <a:miter lim="800000"/>
+                <a:headEnd/>
+                <a:tailEnd/>
+              </a14:hiddenLine>
+            </a:ext>
+            <a:ext uri="{AF507438-7753-43E0-B8FC-AC1667EBCBE1}">
+              <a14:hiddenEffects xmlns:a14="http://schemas.microsoft.com/office/drawing/2010/main">
+                <a:effectLst>
+                  <a:outerShdw dist="35921" dir="2700000" algn="ctr" rotWithShape="0">
+                    <a:schemeClr val="bg2"/>
+                  </a:outerShdw>
+                </a:effectLst>
+              </a14:hiddenEffects>
+            </a:ext>
+          </a:extLst>
+        </p:spPr>
+      </p:pic>
     </p:spTree>
     <p:extLst>
       <p:ext uri="{BB962C8B-B14F-4D97-AF65-F5344CB8AC3E}">
-        <p14:creationId xmlns:p14="http://schemas.microsoft.com/office/powerpoint/2010/main" val="1643680894"/>
+        <p14:creationId xmlns:p14="http://schemas.microsoft.com/office/powerpoint/2010/main" val="3241555147"/>
       </p:ext>
     </p:extLst>
   </p:cSld>
   <p:clrMapOvr>
     <a:masterClrMapping/>
   </p:clrMapOvr>
+  <p:timing>
+    <p:tnLst>
+      <p:par>
+        <p:cTn id="1" dur="indefinite" restart="never" nodeType="tmRoot"/>
+      </p:par>
+    </p:tnLst>
+  </p:timing>
 </p:sld>
 </file>
 
@@ -7144,14 +8245,14 @@
 <file path=customXml/itemProps1.xml><?xml version="1.0" encoding="utf-8"?>
 <ds:datastoreItem xmlns:ds="http://schemas.openxmlformats.org/officeDocument/2006/customXml" ds:itemID="{DB3AD410-478E-4068-B103-32D60D437510}">
   <ds:schemaRefs>
-    <ds:schemaRef ds:uri="http://purl.org/dc/terms/"/>
-    <ds:schemaRef ds:uri="http://schemas.microsoft.com/office/2006/metadata/properties"/>
-    <ds:schemaRef ds:uri="http://purl.org/dc/elements/1.1/"/>
-    <ds:schemaRef ds:uri="http://www.w3.org/XML/1998/namespace"/>
-    <ds:schemaRef ds:uri="http://schemas.microsoft.com/office/2006/documentManagement/types"/>
-    <ds:schemaRef ds:uri="http://purl.org/dc/dcmitype/"/>
     <ds:schemaRef ds:uri="http://schemas.microsoft.com/office/infopath/2007/PartnerControls"/>
     <ds:schemaRef ds:uri="http://schemas.openxmlformats.org/package/2006/metadata/core-properties"/>
+    <ds:schemaRef ds:uri="http://www.w3.org/XML/1998/namespace"/>
+    <ds:schemaRef ds:uri="http://purl.org/dc/elements/1.1/"/>
+    <ds:schemaRef ds:uri="http://schemas.microsoft.com/office/2006/metadata/properties"/>
+    <ds:schemaRef ds:uri="http://schemas.microsoft.com/office/2006/documentManagement/types"/>
+    <ds:schemaRef ds:uri="http://purl.org/dc/terms/"/>
+    <ds:schemaRef ds:uri="http://purl.org/dc/dcmitype/"/>
   </ds:schemaRefs>
 </ds:datastoreItem>
 </file>

</xml_diff>